<commit_message>
add estado e cidade
</commit_message>
<xml_diff>
--- a/imagens/plano de fundo/plano de fundo.pptx
+++ b/imagens/plano de fundo/plano de fundo.pptx
@@ -106,6 +106,11 @@
       </a:defRPr>
     </a:lvl9pPr>
   </p:defaultTextStyle>
+  <p:extLst>
+    <p:ext uri="{EFAFB233-063F-42B5-8137-9DF3F51BA10A}">
+      <p15:sldGuideLst xmlns:p15="http://schemas.microsoft.com/office/powerpoint/2012/main"/>
+    </p:ext>
+  </p:extLst>
 </p:presentation>
 </file>
 
@@ -131,7 +136,7 @@
           <p:cNvPr id="2" name="Título 1">
             <a:extLst>
               <a:ext uri="{FF2B5EF4-FFF2-40B4-BE49-F238E27FC236}">
-                <a16:creationId xmlns:a16="http://schemas.microsoft.com/office/drawing/2014/main" id="{187167AE-F679-8016-9792-F05F5EE9FAA8}"/>
+                <a16:creationId xmlns="" xmlns:a16="http://schemas.microsoft.com/office/drawing/2014/main" id="{187167AE-F679-8016-9792-F05F5EE9FAA8}"/>
               </a:ext>
             </a:extLst>
           </p:cNvPr>
@@ -168,7 +173,7 @@
           <p:cNvPr id="3" name="Subtítulo 2">
             <a:extLst>
               <a:ext uri="{FF2B5EF4-FFF2-40B4-BE49-F238E27FC236}">
-                <a16:creationId xmlns:a16="http://schemas.microsoft.com/office/drawing/2014/main" id="{8A4CBAF0-7D56-F80B-3D67-D79BCE168C84}"/>
+                <a16:creationId xmlns="" xmlns:a16="http://schemas.microsoft.com/office/drawing/2014/main" id="{8A4CBAF0-7D56-F80B-3D67-D79BCE168C84}"/>
               </a:ext>
             </a:extLst>
           </p:cNvPr>
@@ -238,7 +243,7 @@
           <p:cNvPr id="4" name="Espaço Reservado para Data 3">
             <a:extLst>
               <a:ext uri="{FF2B5EF4-FFF2-40B4-BE49-F238E27FC236}">
-                <a16:creationId xmlns:a16="http://schemas.microsoft.com/office/drawing/2014/main" id="{843CB5B9-9A09-3A3A-BC4E-AC165CB2556A}"/>
+                <a16:creationId xmlns="" xmlns:a16="http://schemas.microsoft.com/office/drawing/2014/main" id="{843CB5B9-9A09-3A3A-BC4E-AC165CB2556A}"/>
               </a:ext>
             </a:extLst>
           </p:cNvPr>
@@ -256,7 +261,7 @@
           <a:p>
             <a:fld id="{0D44C6F7-F01E-4ED6-A042-CD0D46826E32}" type="datetimeFigureOut">
               <a:rPr lang="pt-BR" smtClean="0"/>
-              <a:t>08/05/2023</a:t>
+              <a:t>11/05/2023</a:t>
             </a:fld>
             <a:endParaRPr lang="pt-BR"/>
           </a:p>
@@ -267,7 +272,7 @@
           <p:cNvPr id="5" name="Espaço Reservado para Rodapé 4">
             <a:extLst>
               <a:ext uri="{FF2B5EF4-FFF2-40B4-BE49-F238E27FC236}">
-                <a16:creationId xmlns:a16="http://schemas.microsoft.com/office/drawing/2014/main" id="{588115DD-3503-8813-B43B-F54519CF656D}"/>
+                <a16:creationId xmlns="" xmlns:a16="http://schemas.microsoft.com/office/drawing/2014/main" id="{588115DD-3503-8813-B43B-F54519CF656D}"/>
               </a:ext>
             </a:extLst>
           </p:cNvPr>
@@ -292,7 +297,7 @@
           <p:cNvPr id="6" name="Espaço Reservado para Número de Slide 5">
             <a:extLst>
               <a:ext uri="{FF2B5EF4-FFF2-40B4-BE49-F238E27FC236}">
-                <a16:creationId xmlns:a16="http://schemas.microsoft.com/office/drawing/2014/main" id="{777F9E18-6D49-059C-6A9D-B9CC5B212756}"/>
+                <a16:creationId xmlns="" xmlns:a16="http://schemas.microsoft.com/office/drawing/2014/main" id="{777F9E18-6D49-059C-6A9D-B9CC5B212756}"/>
               </a:ext>
             </a:extLst>
           </p:cNvPr>
@@ -351,7 +356,7 @@
           <p:cNvPr id="2" name="Título 1">
             <a:extLst>
               <a:ext uri="{FF2B5EF4-FFF2-40B4-BE49-F238E27FC236}">
-                <a16:creationId xmlns:a16="http://schemas.microsoft.com/office/drawing/2014/main" id="{3B02CA49-36E1-9784-F763-A7BA0BD62D10}"/>
+                <a16:creationId xmlns="" xmlns:a16="http://schemas.microsoft.com/office/drawing/2014/main" id="{3B02CA49-36E1-9784-F763-A7BA0BD62D10}"/>
               </a:ext>
             </a:extLst>
           </p:cNvPr>
@@ -379,7 +384,7 @@
           <p:cNvPr id="3" name="Espaço Reservado para Texto Vertical 2">
             <a:extLst>
               <a:ext uri="{FF2B5EF4-FFF2-40B4-BE49-F238E27FC236}">
-                <a16:creationId xmlns:a16="http://schemas.microsoft.com/office/drawing/2014/main" id="{11E72221-8202-0079-7E93-22DC9723180C}"/>
+                <a16:creationId xmlns="" xmlns:a16="http://schemas.microsoft.com/office/drawing/2014/main" id="{11E72221-8202-0079-7E93-22DC9723180C}"/>
               </a:ext>
             </a:extLst>
           </p:cNvPr>
@@ -436,7 +441,7 @@
           <p:cNvPr id="4" name="Espaço Reservado para Data 3">
             <a:extLst>
               <a:ext uri="{FF2B5EF4-FFF2-40B4-BE49-F238E27FC236}">
-                <a16:creationId xmlns:a16="http://schemas.microsoft.com/office/drawing/2014/main" id="{0EFED0B5-E769-60DF-7728-FFB06D6FD50C}"/>
+                <a16:creationId xmlns="" xmlns:a16="http://schemas.microsoft.com/office/drawing/2014/main" id="{0EFED0B5-E769-60DF-7728-FFB06D6FD50C}"/>
               </a:ext>
             </a:extLst>
           </p:cNvPr>
@@ -454,7 +459,7 @@
           <a:p>
             <a:fld id="{0D44C6F7-F01E-4ED6-A042-CD0D46826E32}" type="datetimeFigureOut">
               <a:rPr lang="pt-BR" smtClean="0"/>
-              <a:t>08/05/2023</a:t>
+              <a:t>11/05/2023</a:t>
             </a:fld>
             <a:endParaRPr lang="pt-BR"/>
           </a:p>
@@ -465,7 +470,7 @@
           <p:cNvPr id="5" name="Espaço Reservado para Rodapé 4">
             <a:extLst>
               <a:ext uri="{FF2B5EF4-FFF2-40B4-BE49-F238E27FC236}">
-                <a16:creationId xmlns:a16="http://schemas.microsoft.com/office/drawing/2014/main" id="{3FB4E137-C1DA-5CF8-8908-0A4A592A22DC}"/>
+                <a16:creationId xmlns="" xmlns:a16="http://schemas.microsoft.com/office/drawing/2014/main" id="{3FB4E137-C1DA-5CF8-8908-0A4A592A22DC}"/>
               </a:ext>
             </a:extLst>
           </p:cNvPr>
@@ -490,7 +495,7 @@
           <p:cNvPr id="6" name="Espaço Reservado para Número de Slide 5">
             <a:extLst>
               <a:ext uri="{FF2B5EF4-FFF2-40B4-BE49-F238E27FC236}">
-                <a16:creationId xmlns:a16="http://schemas.microsoft.com/office/drawing/2014/main" id="{3A8EA799-F487-8A6B-1126-6401EDD4713E}"/>
+                <a16:creationId xmlns="" xmlns:a16="http://schemas.microsoft.com/office/drawing/2014/main" id="{3A8EA799-F487-8A6B-1126-6401EDD4713E}"/>
               </a:ext>
             </a:extLst>
           </p:cNvPr>
@@ -549,7 +554,7 @@
           <p:cNvPr id="2" name="Título Vertical 1">
             <a:extLst>
               <a:ext uri="{FF2B5EF4-FFF2-40B4-BE49-F238E27FC236}">
-                <a16:creationId xmlns:a16="http://schemas.microsoft.com/office/drawing/2014/main" id="{6356211D-3299-6539-0F9D-F46317B22CAB}"/>
+                <a16:creationId xmlns="" xmlns:a16="http://schemas.microsoft.com/office/drawing/2014/main" id="{6356211D-3299-6539-0F9D-F46317B22CAB}"/>
               </a:ext>
             </a:extLst>
           </p:cNvPr>
@@ -582,7 +587,7 @@
           <p:cNvPr id="3" name="Espaço Reservado para Texto Vertical 2">
             <a:extLst>
               <a:ext uri="{FF2B5EF4-FFF2-40B4-BE49-F238E27FC236}">
-                <a16:creationId xmlns:a16="http://schemas.microsoft.com/office/drawing/2014/main" id="{1E2634A7-C127-E83C-48B1-0C9993C0B189}"/>
+                <a16:creationId xmlns="" xmlns:a16="http://schemas.microsoft.com/office/drawing/2014/main" id="{1E2634A7-C127-E83C-48B1-0C9993C0B189}"/>
               </a:ext>
             </a:extLst>
           </p:cNvPr>
@@ -644,7 +649,7 @@
           <p:cNvPr id="4" name="Espaço Reservado para Data 3">
             <a:extLst>
               <a:ext uri="{FF2B5EF4-FFF2-40B4-BE49-F238E27FC236}">
-                <a16:creationId xmlns:a16="http://schemas.microsoft.com/office/drawing/2014/main" id="{2F65F334-E5DB-2ACE-2AF7-9A531C3C39A6}"/>
+                <a16:creationId xmlns="" xmlns:a16="http://schemas.microsoft.com/office/drawing/2014/main" id="{2F65F334-E5DB-2ACE-2AF7-9A531C3C39A6}"/>
               </a:ext>
             </a:extLst>
           </p:cNvPr>
@@ -662,7 +667,7 @@
           <a:p>
             <a:fld id="{0D44C6F7-F01E-4ED6-A042-CD0D46826E32}" type="datetimeFigureOut">
               <a:rPr lang="pt-BR" smtClean="0"/>
-              <a:t>08/05/2023</a:t>
+              <a:t>11/05/2023</a:t>
             </a:fld>
             <a:endParaRPr lang="pt-BR"/>
           </a:p>
@@ -673,7 +678,7 @@
           <p:cNvPr id="5" name="Espaço Reservado para Rodapé 4">
             <a:extLst>
               <a:ext uri="{FF2B5EF4-FFF2-40B4-BE49-F238E27FC236}">
-                <a16:creationId xmlns:a16="http://schemas.microsoft.com/office/drawing/2014/main" id="{E6F6F36D-1569-0F20-50F4-7AE8CCC80A73}"/>
+                <a16:creationId xmlns="" xmlns:a16="http://schemas.microsoft.com/office/drawing/2014/main" id="{E6F6F36D-1569-0F20-50F4-7AE8CCC80A73}"/>
               </a:ext>
             </a:extLst>
           </p:cNvPr>
@@ -698,7 +703,7 @@
           <p:cNvPr id="6" name="Espaço Reservado para Número de Slide 5">
             <a:extLst>
               <a:ext uri="{FF2B5EF4-FFF2-40B4-BE49-F238E27FC236}">
-                <a16:creationId xmlns:a16="http://schemas.microsoft.com/office/drawing/2014/main" id="{984A2A41-6F72-3F0B-BEA1-E3188EF1B96A}"/>
+                <a16:creationId xmlns="" xmlns:a16="http://schemas.microsoft.com/office/drawing/2014/main" id="{984A2A41-6F72-3F0B-BEA1-E3188EF1B96A}"/>
               </a:ext>
             </a:extLst>
           </p:cNvPr>
@@ -757,7 +762,7 @@
           <p:cNvPr id="2" name="Título 1">
             <a:extLst>
               <a:ext uri="{FF2B5EF4-FFF2-40B4-BE49-F238E27FC236}">
-                <a16:creationId xmlns:a16="http://schemas.microsoft.com/office/drawing/2014/main" id="{DCBB43FA-A9FA-3B2A-ECFC-61E72864ADEE}"/>
+                <a16:creationId xmlns="" xmlns:a16="http://schemas.microsoft.com/office/drawing/2014/main" id="{DCBB43FA-A9FA-3B2A-ECFC-61E72864ADEE}"/>
               </a:ext>
             </a:extLst>
           </p:cNvPr>
@@ -785,7 +790,7 @@
           <p:cNvPr id="3" name="Espaço Reservado para Conteúdo 2">
             <a:extLst>
               <a:ext uri="{FF2B5EF4-FFF2-40B4-BE49-F238E27FC236}">
-                <a16:creationId xmlns:a16="http://schemas.microsoft.com/office/drawing/2014/main" id="{6161B6B0-2555-453C-A598-60F3184DADC2}"/>
+                <a16:creationId xmlns="" xmlns:a16="http://schemas.microsoft.com/office/drawing/2014/main" id="{6161B6B0-2555-453C-A598-60F3184DADC2}"/>
               </a:ext>
             </a:extLst>
           </p:cNvPr>
@@ -842,7 +847,7 @@
           <p:cNvPr id="4" name="Espaço Reservado para Data 3">
             <a:extLst>
               <a:ext uri="{FF2B5EF4-FFF2-40B4-BE49-F238E27FC236}">
-                <a16:creationId xmlns:a16="http://schemas.microsoft.com/office/drawing/2014/main" id="{6CACF8CC-FFD9-49DE-FA33-2D9DD7031C75}"/>
+                <a16:creationId xmlns="" xmlns:a16="http://schemas.microsoft.com/office/drawing/2014/main" id="{6CACF8CC-FFD9-49DE-FA33-2D9DD7031C75}"/>
               </a:ext>
             </a:extLst>
           </p:cNvPr>
@@ -860,7 +865,7 @@
           <a:p>
             <a:fld id="{0D44C6F7-F01E-4ED6-A042-CD0D46826E32}" type="datetimeFigureOut">
               <a:rPr lang="pt-BR" smtClean="0"/>
-              <a:t>08/05/2023</a:t>
+              <a:t>11/05/2023</a:t>
             </a:fld>
             <a:endParaRPr lang="pt-BR"/>
           </a:p>
@@ -871,7 +876,7 @@
           <p:cNvPr id="5" name="Espaço Reservado para Rodapé 4">
             <a:extLst>
               <a:ext uri="{FF2B5EF4-FFF2-40B4-BE49-F238E27FC236}">
-                <a16:creationId xmlns:a16="http://schemas.microsoft.com/office/drawing/2014/main" id="{DED276F9-AB67-EFE0-E8C6-34D5A53A04C2}"/>
+                <a16:creationId xmlns="" xmlns:a16="http://schemas.microsoft.com/office/drawing/2014/main" id="{DED276F9-AB67-EFE0-E8C6-34D5A53A04C2}"/>
               </a:ext>
             </a:extLst>
           </p:cNvPr>
@@ -896,7 +901,7 @@
           <p:cNvPr id="6" name="Espaço Reservado para Número de Slide 5">
             <a:extLst>
               <a:ext uri="{FF2B5EF4-FFF2-40B4-BE49-F238E27FC236}">
-                <a16:creationId xmlns:a16="http://schemas.microsoft.com/office/drawing/2014/main" id="{7F04CB7E-B494-2C0F-5259-0A8892AF4414}"/>
+                <a16:creationId xmlns="" xmlns:a16="http://schemas.microsoft.com/office/drawing/2014/main" id="{7F04CB7E-B494-2C0F-5259-0A8892AF4414}"/>
               </a:ext>
             </a:extLst>
           </p:cNvPr>
@@ -955,7 +960,7 @@
           <p:cNvPr id="2" name="Título 1">
             <a:extLst>
               <a:ext uri="{FF2B5EF4-FFF2-40B4-BE49-F238E27FC236}">
-                <a16:creationId xmlns:a16="http://schemas.microsoft.com/office/drawing/2014/main" id="{34E1035B-FB89-5689-0DA9-C92E20BC49E4}"/>
+                <a16:creationId xmlns="" xmlns:a16="http://schemas.microsoft.com/office/drawing/2014/main" id="{34E1035B-FB89-5689-0DA9-C92E20BC49E4}"/>
               </a:ext>
             </a:extLst>
           </p:cNvPr>
@@ -992,7 +997,7 @@
           <p:cNvPr id="3" name="Espaço Reservado para Texto 2">
             <a:extLst>
               <a:ext uri="{FF2B5EF4-FFF2-40B4-BE49-F238E27FC236}">
-                <a16:creationId xmlns:a16="http://schemas.microsoft.com/office/drawing/2014/main" id="{47C3BFAC-A0C4-2258-A65C-00858E1486E2}"/>
+                <a16:creationId xmlns="" xmlns:a16="http://schemas.microsoft.com/office/drawing/2014/main" id="{47C3BFAC-A0C4-2258-A65C-00858E1486E2}"/>
               </a:ext>
             </a:extLst>
           </p:cNvPr>
@@ -1117,7 +1122,7 @@
           <p:cNvPr id="4" name="Espaço Reservado para Data 3">
             <a:extLst>
               <a:ext uri="{FF2B5EF4-FFF2-40B4-BE49-F238E27FC236}">
-                <a16:creationId xmlns:a16="http://schemas.microsoft.com/office/drawing/2014/main" id="{773080EB-3451-8950-1066-79B1A75DEC95}"/>
+                <a16:creationId xmlns="" xmlns:a16="http://schemas.microsoft.com/office/drawing/2014/main" id="{773080EB-3451-8950-1066-79B1A75DEC95}"/>
               </a:ext>
             </a:extLst>
           </p:cNvPr>
@@ -1135,7 +1140,7 @@
           <a:p>
             <a:fld id="{0D44C6F7-F01E-4ED6-A042-CD0D46826E32}" type="datetimeFigureOut">
               <a:rPr lang="pt-BR" smtClean="0"/>
-              <a:t>08/05/2023</a:t>
+              <a:t>11/05/2023</a:t>
             </a:fld>
             <a:endParaRPr lang="pt-BR"/>
           </a:p>
@@ -1146,7 +1151,7 @@
           <p:cNvPr id="5" name="Espaço Reservado para Rodapé 4">
             <a:extLst>
               <a:ext uri="{FF2B5EF4-FFF2-40B4-BE49-F238E27FC236}">
-                <a16:creationId xmlns:a16="http://schemas.microsoft.com/office/drawing/2014/main" id="{25E07CEE-D837-F167-B64B-1554D311180A}"/>
+                <a16:creationId xmlns="" xmlns:a16="http://schemas.microsoft.com/office/drawing/2014/main" id="{25E07CEE-D837-F167-B64B-1554D311180A}"/>
               </a:ext>
             </a:extLst>
           </p:cNvPr>
@@ -1171,7 +1176,7 @@
           <p:cNvPr id="6" name="Espaço Reservado para Número de Slide 5">
             <a:extLst>
               <a:ext uri="{FF2B5EF4-FFF2-40B4-BE49-F238E27FC236}">
-                <a16:creationId xmlns:a16="http://schemas.microsoft.com/office/drawing/2014/main" id="{D3AD726A-8DA6-7CB0-8DFC-44B2B85A5774}"/>
+                <a16:creationId xmlns="" xmlns:a16="http://schemas.microsoft.com/office/drawing/2014/main" id="{D3AD726A-8DA6-7CB0-8DFC-44B2B85A5774}"/>
               </a:ext>
             </a:extLst>
           </p:cNvPr>
@@ -1230,7 +1235,7 @@
           <p:cNvPr id="2" name="Título 1">
             <a:extLst>
               <a:ext uri="{FF2B5EF4-FFF2-40B4-BE49-F238E27FC236}">
-                <a16:creationId xmlns:a16="http://schemas.microsoft.com/office/drawing/2014/main" id="{0D83E996-63CB-0E89-4EEC-C6A5C11B72F3}"/>
+                <a16:creationId xmlns="" xmlns:a16="http://schemas.microsoft.com/office/drawing/2014/main" id="{0D83E996-63CB-0E89-4EEC-C6A5C11B72F3}"/>
               </a:ext>
             </a:extLst>
           </p:cNvPr>
@@ -1258,7 +1263,7 @@
           <p:cNvPr id="3" name="Espaço Reservado para Conteúdo 2">
             <a:extLst>
               <a:ext uri="{FF2B5EF4-FFF2-40B4-BE49-F238E27FC236}">
-                <a16:creationId xmlns:a16="http://schemas.microsoft.com/office/drawing/2014/main" id="{C5B1627B-AEA3-10D4-B48F-D645907A69AC}"/>
+                <a16:creationId xmlns="" xmlns:a16="http://schemas.microsoft.com/office/drawing/2014/main" id="{C5B1627B-AEA3-10D4-B48F-D645907A69AC}"/>
               </a:ext>
             </a:extLst>
           </p:cNvPr>
@@ -1320,7 +1325,7 @@
           <p:cNvPr id="4" name="Espaço Reservado para Conteúdo 3">
             <a:extLst>
               <a:ext uri="{FF2B5EF4-FFF2-40B4-BE49-F238E27FC236}">
-                <a16:creationId xmlns:a16="http://schemas.microsoft.com/office/drawing/2014/main" id="{83009645-3778-1475-4FA9-E89F5FFF0310}"/>
+                <a16:creationId xmlns="" xmlns:a16="http://schemas.microsoft.com/office/drawing/2014/main" id="{83009645-3778-1475-4FA9-E89F5FFF0310}"/>
               </a:ext>
             </a:extLst>
           </p:cNvPr>
@@ -1382,7 +1387,7 @@
           <p:cNvPr id="5" name="Espaço Reservado para Data 4">
             <a:extLst>
               <a:ext uri="{FF2B5EF4-FFF2-40B4-BE49-F238E27FC236}">
-                <a16:creationId xmlns:a16="http://schemas.microsoft.com/office/drawing/2014/main" id="{C8F12DFF-2745-5A82-DCC2-D9E3E9602B39}"/>
+                <a16:creationId xmlns="" xmlns:a16="http://schemas.microsoft.com/office/drawing/2014/main" id="{C8F12DFF-2745-5A82-DCC2-D9E3E9602B39}"/>
               </a:ext>
             </a:extLst>
           </p:cNvPr>
@@ -1400,7 +1405,7 @@
           <a:p>
             <a:fld id="{0D44C6F7-F01E-4ED6-A042-CD0D46826E32}" type="datetimeFigureOut">
               <a:rPr lang="pt-BR" smtClean="0"/>
-              <a:t>08/05/2023</a:t>
+              <a:t>11/05/2023</a:t>
             </a:fld>
             <a:endParaRPr lang="pt-BR"/>
           </a:p>
@@ -1411,7 +1416,7 @@
           <p:cNvPr id="6" name="Espaço Reservado para Rodapé 5">
             <a:extLst>
               <a:ext uri="{FF2B5EF4-FFF2-40B4-BE49-F238E27FC236}">
-                <a16:creationId xmlns:a16="http://schemas.microsoft.com/office/drawing/2014/main" id="{54420E94-D9F8-BE0D-E605-19A7AD9EF571}"/>
+                <a16:creationId xmlns="" xmlns:a16="http://schemas.microsoft.com/office/drawing/2014/main" id="{54420E94-D9F8-BE0D-E605-19A7AD9EF571}"/>
               </a:ext>
             </a:extLst>
           </p:cNvPr>
@@ -1436,7 +1441,7 @@
           <p:cNvPr id="7" name="Espaço Reservado para Número de Slide 6">
             <a:extLst>
               <a:ext uri="{FF2B5EF4-FFF2-40B4-BE49-F238E27FC236}">
-                <a16:creationId xmlns:a16="http://schemas.microsoft.com/office/drawing/2014/main" id="{23BB0CE2-67FF-C6E9-C98E-273E28A662B2}"/>
+                <a16:creationId xmlns="" xmlns:a16="http://schemas.microsoft.com/office/drawing/2014/main" id="{23BB0CE2-67FF-C6E9-C98E-273E28A662B2}"/>
               </a:ext>
             </a:extLst>
           </p:cNvPr>
@@ -1495,7 +1500,7 @@
           <p:cNvPr id="2" name="Título 1">
             <a:extLst>
               <a:ext uri="{FF2B5EF4-FFF2-40B4-BE49-F238E27FC236}">
-                <a16:creationId xmlns:a16="http://schemas.microsoft.com/office/drawing/2014/main" id="{EAAA930C-2A67-B756-FC6B-18BE65589A42}"/>
+                <a16:creationId xmlns="" xmlns:a16="http://schemas.microsoft.com/office/drawing/2014/main" id="{EAAA930C-2A67-B756-FC6B-18BE65589A42}"/>
               </a:ext>
             </a:extLst>
           </p:cNvPr>
@@ -1528,7 +1533,7 @@
           <p:cNvPr id="3" name="Espaço Reservado para Texto 2">
             <a:extLst>
               <a:ext uri="{FF2B5EF4-FFF2-40B4-BE49-F238E27FC236}">
-                <a16:creationId xmlns:a16="http://schemas.microsoft.com/office/drawing/2014/main" id="{287F0AB2-F851-6240-9344-5A57E27B3951}"/>
+                <a16:creationId xmlns="" xmlns:a16="http://schemas.microsoft.com/office/drawing/2014/main" id="{287F0AB2-F851-6240-9344-5A57E27B3951}"/>
               </a:ext>
             </a:extLst>
           </p:cNvPr>
@@ -1599,7 +1604,7 @@
           <p:cNvPr id="4" name="Espaço Reservado para Conteúdo 3">
             <a:extLst>
               <a:ext uri="{FF2B5EF4-FFF2-40B4-BE49-F238E27FC236}">
-                <a16:creationId xmlns:a16="http://schemas.microsoft.com/office/drawing/2014/main" id="{EF8DD6F7-A134-6446-4E19-A227003AB34B}"/>
+                <a16:creationId xmlns="" xmlns:a16="http://schemas.microsoft.com/office/drawing/2014/main" id="{EF8DD6F7-A134-6446-4E19-A227003AB34B}"/>
               </a:ext>
             </a:extLst>
           </p:cNvPr>
@@ -1661,7 +1666,7 @@
           <p:cNvPr id="5" name="Espaço Reservado para Texto 4">
             <a:extLst>
               <a:ext uri="{FF2B5EF4-FFF2-40B4-BE49-F238E27FC236}">
-                <a16:creationId xmlns:a16="http://schemas.microsoft.com/office/drawing/2014/main" id="{A73543D5-B23A-25BD-4256-5949E09667DB}"/>
+                <a16:creationId xmlns="" xmlns:a16="http://schemas.microsoft.com/office/drawing/2014/main" id="{A73543D5-B23A-25BD-4256-5949E09667DB}"/>
               </a:ext>
             </a:extLst>
           </p:cNvPr>
@@ -1732,7 +1737,7 @@
           <p:cNvPr id="6" name="Espaço Reservado para Conteúdo 5">
             <a:extLst>
               <a:ext uri="{FF2B5EF4-FFF2-40B4-BE49-F238E27FC236}">
-                <a16:creationId xmlns:a16="http://schemas.microsoft.com/office/drawing/2014/main" id="{71107C93-83A5-E6A5-2557-599E1235A758}"/>
+                <a16:creationId xmlns="" xmlns:a16="http://schemas.microsoft.com/office/drawing/2014/main" id="{71107C93-83A5-E6A5-2557-599E1235A758}"/>
               </a:ext>
             </a:extLst>
           </p:cNvPr>
@@ -1794,7 +1799,7 @@
           <p:cNvPr id="7" name="Espaço Reservado para Data 6">
             <a:extLst>
               <a:ext uri="{FF2B5EF4-FFF2-40B4-BE49-F238E27FC236}">
-                <a16:creationId xmlns:a16="http://schemas.microsoft.com/office/drawing/2014/main" id="{98FF8BE8-40B8-9BA8-B784-7FC450C95D6F}"/>
+                <a16:creationId xmlns="" xmlns:a16="http://schemas.microsoft.com/office/drawing/2014/main" id="{98FF8BE8-40B8-9BA8-B784-7FC450C95D6F}"/>
               </a:ext>
             </a:extLst>
           </p:cNvPr>
@@ -1812,7 +1817,7 @@
           <a:p>
             <a:fld id="{0D44C6F7-F01E-4ED6-A042-CD0D46826E32}" type="datetimeFigureOut">
               <a:rPr lang="pt-BR" smtClean="0"/>
-              <a:t>08/05/2023</a:t>
+              <a:t>11/05/2023</a:t>
             </a:fld>
             <a:endParaRPr lang="pt-BR"/>
           </a:p>
@@ -1823,7 +1828,7 @@
           <p:cNvPr id="8" name="Espaço Reservado para Rodapé 7">
             <a:extLst>
               <a:ext uri="{FF2B5EF4-FFF2-40B4-BE49-F238E27FC236}">
-                <a16:creationId xmlns:a16="http://schemas.microsoft.com/office/drawing/2014/main" id="{C386C4D7-61AF-FC49-44DC-3AE56C841376}"/>
+                <a16:creationId xmlns="" xmlns:a16="http://schemas.microsoft.com/office/drawing/2014/main" id="{C386C4D7-61AF-FC49-44DC-3AE56C841376}"/>
               </a:ext>
             </a:extLst>
           </p:cNvPr>
@@ -1848,7 +1853,7 @@
           <p:cNvPr id="9" name="Espaço Reservado para Número de Slide 8">
             <a:extLst>
               <a:ext uri="{FF2B5EF4-FFF2-40B4-BE49-F238E27FC236}">
-                <a16:creationId xmlns:a16="http://schemas.microsoft.com/office/drawing/2014/main" id="{D3E80BD1-CE88-C7EF-C3A0-39668B867A05}"/>
+                <a16:creationId xmlns="" xmlns:a16="http://schemas.microsoft.com/office/drawing/2014/main" id="{D3E80BD1-CE88-C7EF-C3A0-39668B867A05}"/>
               </a:ext>
             </a:extLst>
           </p:cNvPr>
@@ -1907,7 +1912,7 @@
           <p:cNvPr id="2" name="Título 1">
             <a:extLst>
               <a:ext uri="{FF2B5EF4-FFF2-40B4-BE49-F238E27FC236}">
-                <a16:creationId xmlns:a16="http://schemas.microsoft.com/office/drawing/2014/main" id="{5C0915AE-597B-AAC3-D0C0-AE8DAD68FA67}"/>
+                <a16:creationId xmlns="" xmlns:a16="http://schemas.microsoft.com/office/drawing/2014/main" id="{5C0915AE-597B-AAC3-D0C0-AE8DAD68FA67}"/>
               </a:ext>
             </a:extLst>
           </p:cNvPr>
@@ -1935,7 +1940,7 @@
           <p:cNvPr id="3" name="Espaço Reservado para Data 2">
             <a:extLst>
               <a:ext uri="{FF2B5EF4-FFF2-40B4-BE49-F238E27FC236}">
-                <a16:creationId xmlns:a16="http://schemas.microsoft.com/office/drawing/2014/main" id="{257DE5DD-AFA4-A05A-26AA-B9F794CDBE22}"/>
+                <a16:creationId xmlns="" xmlns:a16="http://schemas.microsoft.com/office/drawing/2014/main" id="{257DE5DD-AFA4-A05A-26AA-B9F794CDBE22}"/>
               </a:ext>
             </a:extLst>
           </p:cNvPr>
@@ -1953,7 +1958,7 @@
           <a:p>
             <a:fld id="{0D44C6F7-F01E-4ED6-A042-CD0D46826E32}" type="datetimeFigureOut">
               <a:rPr lang="pt-BR" smtClean="0"/>
-              <a:t>08/05/2023</a:t>
+              <a:t>11/05/2023</a:t>
             </a:fld>
             <a:endParaRPr lang="pt-BR"/>
           </a:p>
@@ -1964,7 +1969,7 @@
           <p:cNvPr id="4" name="Espaço Reservado para Rodapé 3">
             <a:extLst>
               <a:ext uri="{FF2B5EF4-FFF2-40B4-BE49-F238E27FC236}">
-                <a16:creationId xmlns:a16="http://schemas.microsoft.com/office/drawing/2014/main" id="{9CE0D527-34C6-2E6F-44B4-E9A35C3EB03A}"/>
+                <a16:creationId xmlns="" xmlns:a16="http://schemas.microsoft.com/office/drawing/2014/main" id="{9CE0D527-34C6-2E6F-44B4-E9A35C3EB03A}"/>
               </a:ext>
             </a:extLst>
           </p:cNvPr>
@@ -1989,7 +1994,7 @@
           <p:cNvPr id="5" name="Espaço Reservado para Número de Slide 4">
             <a:extLst>
               <a:ext uri="{FF2B5EF4-FFF2-40B4-BE49-F238E27FC236}">
-                <a16:creationId xmlns:a16="http://schemas.microsoft.com/office/drawing/2014/main" id="{BD60BBE4-3DA2-7A65-97C3-DCB10CEE17C7}"/>
+                <a16:creationId xmlns="" xmlns:a16="http://schemas.microsoft.com/office/drawing/2014/main" id="{BD60BBE4-3DA2-7A65-97C3-DCB10CEE17C7}"/>
               </a:ext>
             </a:extLst>
           </p:cNvPr>
@@ -2048,7 +2053,7 @@
           <p:cNvPr id="2" name="Espaço Reservado para Data 1">
             <a:extLst>
               <a:ext uri="{FF2B5EF4-FFF2-40B4-BE49-F238E27FC236}">
-                <a16:creationId xmlns:a16="http://schemas.microsoft.com/office/drawing/2014/main" id="{504B7425-2C55-A93E-36FC-2FF761DE4E46}"/>
+                <a16:creationId xmlns="" xmlns:a16="http://schemas.microsoft.com/office/drawing/2014/main" id="{504B7425-2C55-A93E-36FC-2FF761DE4E46}"/>
               </a:ext>
             </a:extLst>
           </p:cNvPr>
@@ -2066,7 +2071,7 @@
           <a:p>
             <a:fld id="{0D44C6F7-F01E-4ED6-A042-CD0D46826E32}" type="datetimeFigureOut">
               <a:rPr lang="pt-BR" smtClean="0"/>
-              <a:t>08/05/2023</a:t>
+              <a:t>11/05/2023</a:t>
             </a:fld>
             <a:endParaRPr lang="pt-BR"/>
           </a:p>
@@ -2077,7 +2082,7 @@
           <p:cNvPr id="3" name="Espaço Reservado para Rodapé 2">
             <a:extLst>
               <a:ext uri="{FF2B5EF4-FFF2-40B4-BE49-F238E27FC236}">
-                <a16:creationId xmlns:a16="http://schemas.microsoft.com/office/drawing/2014/main" id="{0F48F578-2AC0-AC89-FFE6-A5D371887E57}"/>
+                <a16:creationId xmlns="" xmlns:a16="http://schemas.microsoft.com/office/drawing/2014/main" id="{0F48F578-2AC0-AC89-FFE6-A5D371887E57}"/>
               </a:ext>
             </a:extLst>
           </p:cNvPr>
@@ -2102,7 +2107,7 @@
           <p:cNvPr id="4" name="Espaço Reservado para Número de Slide 3">
             <a:extLst>
               <a:ext uri="{FF2B5EF4-FFF2-40B4-BE49-F238E27FC236}">
-                <a16:creationId xmlns:a16="http://schemas.microsoft.com/office/drawing/2014/main" id="{FF6D1645-57EF-65A7-43C1-20D6CFF97BB3}"/>
+                <a16:creationId xmlns="" xmlns:a16="http://schemas.microsoft.com/office/drawing/2014/main" id="{FF6D1645-57EF-65A7-43C1-20D6CFF97BB3}"/>
               </a:ext>
             </a:extLst>
           </p:cNvPr>
@@ -2161,7 +2166,7 @@
           <p:cNvPr id="2" name="Título 1">
             <a:extLst>
               <a:ext uri="{FF2B5EF4-FFF2-40B4-BE49-F238E27FC236}">
-                <a16:creationId xmlns:a16="http://schemas.microsoft.com/office/drawing/2014/main" id="{CF03823C-B9CB-7202-4810-4BD771CFD770}"/>
+                <a16:creationId xmlns="" xmlns:a16="http://schemas.microsoft.com/office/drawing/2014/main" id="{CF03823C-B9CB-7202-4810-4BD771CFD770}"/>
               </a:ext>
             </a:extLst>
           </p:cNvPr>
@@ -2198,7 +2203,7 @@
           <p:cNvPr id="3" name="Espaço Reservado para Conteúdo 2">
             <a:extLst>
               <a:ext uri="{FF2B5EF4-FFF2-40B4-BE49-F238E27FC236}">
-                <a16:creationId xmlns:a16="http://schemas.microsoft.com/office/drawing/2014/main" id="{9280B1C2-9D56-5528-2065-6B2887898D44}"/>
+                <a16:creationId xmlns="" xmlns:a16="http://schemas.microsoft.com/office/drawing/2014/main" id="{9280B1C2-9D56-5528-2065-6B2887898D44}"/>
               </a:ext>
             </a:extLst>
           </p:cNvPr>
@@ -2288,7 +2293,7 @@
           <p:cNvPr id="4" name="Espaço Reservado para Texto 3">
             <a:extLst>
               <a:ext uri="{FF2B5EF4-FFF2-40B4-BE49-F238E27FC236}">
-                <a16:creationId xmlns:a16="http://schemas.microsoft.com/office/drawing/2014/main" id="{8B2B614F-5BDC-D5A4-7951-F5CB5730E546}"/>
+                <a16:creationId xmlns="" xmlns:a16="http://schemas.microsoft.com/office/drawing/2014/main" id="{8B2B614F-5BDC-D5A4-7951-F5CB5730E546}"/>
               </a:ext>
             </a:extLst>
           </p:cNvPr>
@@ -2359,7 +2364,7 @@
           <p:cNvPr id="5" name="Espaço Reservado para Data 4">
             <a:extLst>
               <a:ext uri="{FF2B5EF4-FFF2-40B4-BE49-F238E27FC236}">
-                <a16:creationId xmlns:a16="http://schemas.microsoft.com/office/drawing/2014/main" id="{57B7BD6A-5313-5243-A8F8-95913EA2921A}"/>
+                <a16:creationId xmlns="" xmlns:a16="http://schemas.microsoft.com/office/drawing/2014/main" id="{57B7BD6A-5313-5243-A8F8-95913EA2921A}"/>
               </a:ext>
             </a:extLst>
           </p:cNvPr>
@@ -2377,7 +2382,7 @@
           <a:p>
             <a:fld id="{0D44C6F7-F01E-4ED6-A042-CD0D46826E32}" type="datetimeFigureOut">
               <a:rPr lang="pt-BR" smtClean="0"/>
-              <a:t>08/05/2023</a:t>
+              <a:t>11/05/2023</a:t>
             </a:fld>
             <a:endParaRPr lang="pt-BR"/>
           </a:p>
@@ -2388,7 +2393,7 @@
           <p:cNvPr id="6" name="Espaço Reservado para Rodapé 5">
             <a:extLst>
               <a:ext uri="{FF2B5EF4-FFF2-40B4-BE49-F238E27FC236}">
-                <a16:creationId xmlns:a16="http://schemas.microsoft.com/office/drawing/2014/main" id="{0264C19A-6E6B-A34F-C701-5B43C3CB7E6F}"/>
+                <a16:creationId xmlns="" xmlns:a16="http://schemas.microsoft.com/office/drawing/2014/main" id="{0264C19A-6E6B-A34F-C701-5B43C3CB7E6F}"/>
               </a:ext>
             </a:extLst>
           </p:cNvPr>
@@ -2413,7 +2418,7 @@
           <p:cNvPr id="7" name="Espaço Reservado para Número de Slide 6">
             <a:extLst>
               <a:ext uri="{FF2B5EF4-FFF2-40B4-BE49-F238E27FC236}">
-                <a16:creationId xmlns:a16="http://schemas.microsoft.com/office/drawing/2014/main" id="{ABD3C598-7128-E5CF-25A0-B51DC25551A6}"/>
+                <a16:creationId xmlns="" xmlns:a16="http://schemas.microsoft.com/office/drawing/2014/main" id="{ABD3C598-7128-E5CF-25A0-B51DC25551A6}"/>
               </a:ext>
             </a:extLst>
           </p:cNvPr>
@@ -2472,7 +2477,7 @@
           <p:cNvPr id="2" name="Título 1">
             <a:extLst>
               <a:ext uri="{FF2B5EF4-FFF2-40B4-BE49-F238E27FC236}">
-                <a16:creationId xmlns:a16="http://schemas.microsoft.com/office/drawing/2014/main" id="{F60FB158-4F89-2AC8-23C1-28D8A07CF21E}"/>
+                <a16:creationId xmlns="" xmlns:a16="http://schemas.microsoft.com/office/drawing/2014/main" id="{F60FB158-4F89-2AC8-23C1-28D8A07CF21E}"/>
               </a:ext>
             </a:extLst>
           </p:cNvPr>
@@ -2509,7 +2514,7 @@
           <p:cNvPr id="3" name="Espaço Reservado para Imagem 2">
             <a:extLst>
               <a:ext uri="{FF2B5EF4-FFF2-40B4-BE49-F238E27FC236}">
-                <a16:creationId xmlns:a16="http://schemas.microsoft.com/office/drawing/2014/main" id="{25CDE6F6-ABDE-0C9D-0E4F-372772054FC1}"/>
+                <a16:creationId xmlns="" xmlns:a16="http://schemas.microsoft.com/office/drawing/2014/main" id="{25CDE6F6-ABDE-0C9D-0E4F-372772054FC1}"/>
               </a:ext>
             </a:extLst>
           </p:cNvPr>
@@ -2576,7 +2581,7 @@
           <p:cNvPr id="4" name="Espaço Reservado para Texto 3">
             <a:extLst>
               <a:ext uri="{FF2B5EF4-FFF2-40B4-BE49-F238E27FC236}">
-                <a16:creationId xmlns:a16="http://schemas.microsoft.com/office/drawing/2014/main" id="{5080B686-57BA-E877-0526-30C6F8B46395}"/>
+                <a16:creationId xmlns="" xmlns:a16="http://schemas.microsoft.com/office/drawing/2014/main" id="{5080B686-57BA-E877-0526-30C6F8B46395}"/>
               </a:ext>
             </a:extLst>
           </p:cNvPr>
@@ -2647,7 +2652,7 @@
           <p:cNvPr id="5" name="Espaço Reservado para Data 4">
             <a:extLst>
               <a:ext uri="{FF2B5EF4-FFF2-40B4-BE49-F238E27FC236}">
-                <a16:creationId xmlns:a16="http://schemas.microsoft.com/office/drawing/2014/main" id="{34444D92-1488-7438-AFBE-6D0169FF86D6}"/>
+                <a16:creationId xmlns="" xmlns:a16="http://schemas.microsoft.com/office/drawing/2014/main" id="{34444D92-1488-7438-AFBE-6D0169FF86D6}"/>
               </a:ext>
             </a:extLst>
           </p:cNvPr>
@@ -2665,7 +2670,7 @@
           <a:p>
             <a:fld id="{0D44C6F7-F01E-4ED6-A042-CD0D46826E32}" type="datetimeFigureOut">
               <a:rPr lang="pt-BR" smtClean="0"/>
-              <a:t>08/05/2023</a:t>
+              <a:t>11/05/2023</a:t>
             </a:fld>
             <a:endParaRPr lang="pt-BR"/>
           </a:p>
@@ -2676,7 +2681,7 @@
           <p:cNvPr id="6" name="Espaço Reservado para Rodapé 5">
             <a:extLst>
               <a:ext uri="{FF2B5EF4-FFF2-40B4-BE49-F238E27FC236}">
-                <a16:creationId xmlns:a16="http://schemas.microsoft.com/office/drawing/2014/main" id="{EDF4128F-2CFA-17A8-F79F-59743A5F7F1D}"/>
+                <a16:creationId xmlns="" xmlns:a16="http://schemas.microsoft.com/office/drawing/2014/main" id="{EDF4128F-2CFA-17A8-F79F-59743A5F7F1D}"/>
               </a:ext>
             </a:extLst>
           </p:cNvPr>
@@ -2701,7 +2706,7 @@
           <p:cNvPr id="7" name="Espaço Reservado para Número de Slide 6">
             <a:extLst>
               <a:ext uri="{FF2B5EF4-FFF2-40B4-BE49-F238E27FC236}">
-                <a16:creationId xmlns:a16="http://schemas.microsoft.com/office/drawing/2014/main" id="{D9A81002-C361-5C8E-BA09-57A3C9B37C72}"/>
+                <a16:creationId xmlns="" xmlns:a16="http://schemas.microsoft.com/office/drawing/2014/main" id="{D9A81002-C361-5C8E-BA09-57A3C9B37C72}"/>
               </a:ext>
             </a:extLst>
           </p:cNvPr>
@@ -2765,7 +2770,7 @@
           <p:cNvPr id="2" name="Espaço Reservado para Título 1">
             <a:extLst>
               <a:ext uri="{FF2B5EF4-FFF2-40B4-BE49-F238E27FC236}">
-                <a16:creationId xmlns:a16="http://schemas.microsoft.com/office/drawing/2014/main" id="{4BBCE0FD-D9AB-E98D-F516-A017034904BC}"/>
+                <a16:creationId xmlns="" xmlns:a16="http://schemas.microsoft.com/office/drawing/2014/main" id="{4BBCE0FD-D9AB-E98D-F516-A017034904BC}"/>
               </a:ext>
             </a:extLst>
           </p:cNvPr>
@@ -2803,7 +2808,7 @@
           <p:cNvPr id="3" name="Espaço Reservado para Texto 2">
             <a:extLst>
               <a:ext uri="{FF2B5EF4-FFF2-40B4-BE49-F238E27FC236}">
-                <a16:creationId xmlns:a16="http://schemas.microsoft.com/office/drawing/2014/main" id="{ACDE973D-9B48-413C-81D1-33300D85A837}"/>
+                <a16:creationId xmlns="" xmlns:a16="http://schemas.microsoft.com/office/drawing/2014/main" id="{ACDE973D-9B48-413C-81D1-33300D85A837}"/>
               </a:ext>
             </a:extLst>
           </p:cNvPr>
@@ -2870,7 +2875,7 @@
           <p:cNvPr id="4" name="Espaço Reservado para Data 3">
             <a:extLst>
               <a:ext uri="{FF2B5EF4-FFF2-40B4-BE49-F238E27FC236}">
-                <a16:creationId xmlns:a16="http://schemas.microsoft.com/office/drawing/2014/main" id="{3BF48FF1-14F5-9B6C-F7F0-6473353504A4}"/>
+                <a16:creationId xmlns="" xmlns:a16="http://schemas.microsoft.com/office/drawing/2014/main" id="{3BF48FF1-14F5-9B6C-F7F0-6473353504A4}"/>
               </a:ext>
             </a:extLst>
           </p:cNvPr>
@@ -2906,7 +2911,7 @@
           <a:p>
             <a:fld id="{0D44C6F7-F01E-4ED6-A042-CD0D46826E32}" type="datetimeFigureOut">
               <a:rPr lang="pt-BR" smtClean="0"/>
-              <a:t>08/05/2023</a:t>
+              <a:t>11/05/2023</a:t>
             </a:fld>
             <a:endParaRPr lang="pt-BR"/>
           </a:p>
@@ -2917,7 +2922,7 @@
           <p:cNvPr id="5" name="Espaço Reservado para Rodapé 4">
             <a:extLst>
               <a:ext uri="{FF2B5EF4-FFF2-40B4-BE49-F238E27FC236}">
-                <a16:creationId xmlns:a16="http://schemas.microsoft.com/office/drawing/2014/main" id="{ACC2C900-079B-F82B-5A59-3F260002E568}"/>
+                <a16:creationId xmlns="" xmlns:a16="http://schemas.microsoft.com/office/drawing/2014/main" id="{ACC2C900-079B-F82B-5A59-3F260002E568}"/>
               </a:ext>
             </a:extLst>
           </p:cNvPr>
@@ -2960,7 +2965,7 @@
           <p:cNvPr id="6" name="Espaço Reservado para Número de Slide 5">
             <a:extLst>
               <a:ext uri="{FF2B5EF4-FFF2-40B4-BE49-F238E27FC236}">
-                <a16:creationId xmlns:a16="http://schemas.microsoft.com/office/drawing/2014/main" id="{00FE3B58-2B70-C201-8A13-0DE32206D617}"/>
+                <a16:creationId xmlns="" xmlns:a16="http://schemas.microsoft.com/office/drawing/2014/main" id="{00FE3B58-2B70-C201-8A13-0DE32206D617}"/>
               </a:ext>
             </a:extLst>
           </p:cNvPr>
@@ -3328,7 +3333,7 @@
           <p:cNvPr id="4" name="Retângulo 3">
             <a:extLst>
               <a:ext uri="{FF2B5EF4-FFF2-40B4-BE49-F238E27FC236}">
-                <a16:creationId xmlns:a16="http://schemas.microsoft.com/office/drawing/2014/main" id="{3BA201EF-028A-4A58-FFA1-51254C6AB7C0}"/>
+                <a16:creationId xmlns="" xmlns:a16="http://schemas.microsoft.com/office/drawing/2014/main" id="{3BA201EF-028A-4A58-FFA1-51254C6AB7C0}"/>
               </a:ext>
             </a:extLst>
           </p:cNvPr>
@@ -3382,7 +3387,7 @@
           <p:cNvPr id="5" name="Retângulo 4">
             <a:extLst>
               <a:ext uri="{FF2B5EF4-FFF2-40B4-BE49-F238E27FC236}">
-                <a16:creationId xmlns:a16="http://schemas.microsoft.com/office/drawing/2014/main" id="{2920BF16-4628-351A-104E-C27415668B81}"/>
+                <a16:creationId xmlns="" xmlns:a16="http://schemas.microsoft.com/office/drawing/2014/main" id="{2920BF16-4628-351A-104E-C27415668B81}"/>
               </a:ext>
             </a:extLst>
           </p:cNvPr>
@@ -3441,7 +3446,7 @@
           <p:cNvPr id="6" name="Retângulo: Cantos Arredondados 5">
             <a:extLst>
               <a:ext uri="{FF2B5EF4-FFF2-40B4-BE49-F238E27FC236}">
-                <a16:creationId xmlns:a16="http://schemas.microsoft.com/office/drawing/2014/main" id="{C9D2942A-A28F-0258-8D12-A28CC24C2DE6}"/>
+                <a16:creationId xmlns="" xmlns:a16="http://schemas.microsoft.com/office/drawing/2014/main" id="{C9D2942A-A28F-0258-8D12-A28CC24C2DE6}"/>
               </a:ext>
             </a:extLst>
           </p:cNvPr>
@@ -3508,7 +3513,7 @@
           <p:cNvPr id="7" name="Retângulo: Cantos Arredondados 6">
             <a:extLst>
               <a:ext uri="{FF2B5EF4-FFF2-40B4-BE49-F238E27FC236}">
-                <a16:creationId xmlns:a16="http://schemas.microsoft.com/office/drawing/2014/main" id="{9DA5E66D-D66E-57F8-877F-DCA698031C15}"/>
+                <a16:creationId xmlns="" xmlns:a16="http://schemas.microsoft.com/office/drawing/2014/main" id="{9DA5E66D-D66E-57F8-877F-DCA698031C15}"/>
               </a:ext>
             </a:extLst>
           </p:cNvPr>
@@ -3570,7 +3575,7 @@
           <p:cNvPr id="8" name="Retângulo: Cantos Arredondados 7">
             <a:extLst>
               <a:ext uri="{FF2B5EF4-FFF2-40B4-BE49-F238E27FC236}">
-                <a16:creationId xmlns:a16="http://schemas.microsoft.com/office/drawing/2014/main" id="{0DA2D9B8-2449-378E-046C-033F668FD65F}"/>
+                <a16:creationId xmlns="" xmlns:a16="http://schemas.microsoft.com/office/drawing/2014/main" id="{0DA2D9B8-2449-378E-046C-033F668FD65F}"/>
               </a:ext>
             </a:extLst>
           </p:cNvPr>
@@ -3632,7 +3637,7 @@
           <p:cNvPr id="9" name="Retângulo: Cantos Arredondados 8">
             <a:extLst>
               <a:ext uri="{FF2B5EF4-FFF2-40B4-BE49-F238E27FC236}">
-                <a16:creationId xmlns:a16="http://schemas.microsoft.com/office/drawing/2014/main" id="{EFA09E1C-398E-DCBA-2992-6E864CDD189A}"/>
+                <a16:creationId xmlns="" xmlns:a16="http://schemas.microsoft.com/office/drawing/2014/main" id="{EFA09E1C-398E-DCBA-2992-6E864CDD189A}"/>
               </a:ext>
             </a:extLst>
           </p:cNvPr>
@@ -3694,7 +3699,7 @@
           <p:cNvPr id="10" name="Retângulo: Cantos Arredondados 9">
             <a:extLst>
               <a:ext uri="{FF2B5EF4-FFF2-40B4-BE49-F238E27FC236}">
-                <a16:creationId xmlns:a16="http://schemas.microsoft.com/office/drawing/2014/main" id="{6BD8202D-5B6B-FEEC-5B8C-15C96F48105D}"/>
+                <a16:creationId xmlns="" xmlns:a16="http://schemas.microsoft.com/office/drawing/2014/main" id="{6BD8202D-5B6B-FEEC-5B8C-15C96F48105D}"/>
               </a:ext>
             </a:extLst>
           </p:cNvPr>
@@ -3756,7 +3761,7 @@
           <p:cNvPr id="11" name="Retângulo: Cantos Arredondados 10">
             <a:extLst>
               <a:ext uri="{FF2B5EF4-FFF2-40B4-BE49-F238E27FC236}">
-                <a16:creationId xmlns:a16="http://schemas.microsoft.com/office/drawing/2014/main" id="{F9F27156-92F1-97F5-879F-D2D39DE46ECA}"/>
+                <a16:creationId xmlns="" xmlns:a16="http://schemas.microsoft.com/office/drawing/2014/main" id="{F9F27156-92F1-97F5-879F-D2D39DE46ECA}"/>
               </a:ext>
             </a:extLst>
           </p:cNvPr>
@@ -3818,7 +3823,7 @@
           <p:cNvPr id="12" name="Retângulo: Cantos Arredondados 11">
             <a:extLst>
               <a:ext uri="{FF2B5EF4-FFF2-40B4-BE49-F238E27FC236}">
-                <a16:creationId xmlns:a16="http://schemas.microsoft.com/office/drawing/2014/main" id="{FB6BAAF6-B2F0-E5EB-7C79-93CD8129F389}"/>
+                <a16:creationId xmlns="" xmlns:a16="http://schemas.microsoft.com/office/drawing/2014/main" id="{FB6BAAF6-B2F0-E5EB-7C79-93CD8129F389}"/>
               </a:ext>
             </a:extLst>
           </p:cNvPr>
@@ -3880,7 +3885,7 @@
           <p:cNvPr id="14" name="Elipse 13">
             <a:extLst>
               <a:ext uri="{FF2B5EF4-FFF2-40B4-BE49-F238E27FC236}">
-                <a16:creationId xmlns:a16="http://schemas.microsoft.com/office/drawing/2014/main" id="{7E3C4A23-DB80-4293-2941-5DB4A50CBD82}"/>
+                <a16:creationId xmlns="" xmlns:a16="http://schemas.microsoft.com/office/drawing/2014/main" id="{7E3C4A23-DB80-4293-2941-5DB4A50CBD82}"/>
               </a:ext>
             </a:extLst>
           </p:cNvPr>
@@ -3970,7 +3975,7 @@
           <p:cNvPr id="4" name="Retângulo 3">
             <a:extLst>
               <a:ext uri="{FF2B5EF4-FFF2-40B4-BE49-F238E27FC236}">
-                <a16:creationId xmlns:a16="http://schemas.microsoft.com/office/drawing/2014/main" id="{3BA201EF-028A-4A58-FFA1-51254C6AB7C0}"/>
+                <a16:creationId xmlns="" xmlns:a16="http://schemas.microsoft.com/office/drawing/2014/main" id="{3BA201EF-028A-4A58-FFA1-51254C6AB7C0}"/>
               </a:ext>
             </a:extLst>
           </p:cNvPr>
@@ -4024,7 +4029,7 @@
           <p:cNvPr id="5" name="Retângulo 4">
             <a:extLst>
               <a:ext uri="{FF2B5EF4-FFF2-40B4-BE49-F238E27FC236}">
-                <a16:creationId xmlns:a16="http://schemas.microsoft.com/office/drawing/2014/main" id="{2920BF16-4628-351A-104E-C27415668B81}"/>
+                <a16:creationId xmlns="" xmlns:a16="http://schemas.microsoft.com/office/drawing/2014/main" id="{2920BF16-4628-351A-104E-C27415668B81}"/>
               </a:ext>
             </a:extLst>
           </p:cNvPr>
@@ -4083,7 +4088,7 @@
           <p:cNvPr id="6" name="Retângulo: Cantos Arredondados 5">
             <a:extLst>
               <a:ext uri="{FF2B5EF4-FFF2-40B4-BE49-F238E27FC236}">
-                <a16:creationId xmlns:a16="http://schemas.microsoft.com/office/drawing/2014/main" id="{C9D2942A-A28F-0258-8D12-A28CC24C2DE6}"/>
+                <a16:creationId xmlns="" xmlns:a16="http://schemas.microsoft.com/office/drawing/2014/main" id="{C9D2942A-A28F-0258-8D12-A28CC24C2DE6}"/>
               </a:ext>
             </a:extLst>
           </p:cNvPr>
@@ -4150,7 +4155,7 @@
           <p:cNvPr id="7" name="Retângulo: Cantos Arredondados 6">
             <a:extLst>
               <a:ext uri="{FF2B5EF4-FFF2-40B4-BE49-F238E27FC236}">
-                <a16:creationId xmlns:a16="http://schemas.microsoft.com/office/drawing/2014/main" id="{9DA5E66D-D66E-57F8-877F-DCA698031C15}"/>
+                <a16:creationId xmlns="" xmlns:a16="http://schemas.microsoft.com/office/drawing/2014/main" id="{9DA5E66D-D66E-57F8-877F-DCA698031C15}"/>
               </a:ext>
             </a:extLst>
           </p:cNvPr>
@@ -4212,7 +4217,7 @@
           <p:cNvPr id="10" name="Retângulo: Cantos Arredondados 9">
             <a:extLst>
               <a:ext uri="{FF2B5EF4-FFF2-40B4-BE49-F238E27FC236}">
-                <a16:creationId xmlns:a16="http://schemas.microsoft.com/office/drawing/2014/main" id="{6BD8202D-5B6B-FEEC-5B8C-15C96F48105D}"/>
+                <a16:creationId xmlns="" xmlns:a16="http://schemas.microsoft.com/office/drawing/2014/main" id="{6BD8202D-5B6B-FEEC-5B8C-15C96F48105D}"/>
               </a:ext>
             </a:extLst>
           </p:cNvPr>
@@ -4274,7 +4279,7 @@
           <p:cNvPr id="11" name="Retângulo: Cantos Arredondados 10">
             <a:extLst>
               <a:ext uri="{FF2B5EF4-FFF2-40B4-BE49-F238E27FC236}">
-                <a16:creationId xmlns:a16="http://schemas.microsoft.com/office/drawing/2014/main" id="{F9F27156-92F1-97F5-879F-D2D39DE46ECA}"/>
+                <a16:creationId xmlns="" xmlns:a16="http://schemas.microsoft.com/office/drawing/2014/main" id="{F9F27156-92F1-97F5-879F-D2D39DE46ECA}"/>
               </a:ext>
             </a:extLst>
           </p:cNvPr>
@@ -4336,7 +4341,7 @@
           <p:cNvPr id="14" name="Elipse 13">
             <a:extLst>
               <a:ext uri="{FF2B5EF4-FFF2-40B4-BE49-F238E27FC236}">
-                <a16:creationId xmlns:a16="http://schemas.microsoft.com/office/drawing/2014/main" id="{7E3C4A23-DB80-4293-2941-5DB4A50CBD82}"/>
+                <a16:creationId xmlns="" xmlns:a16="http://schemas.microsoft.com/office/drawing/2014/main" id="{7E3C4A23-DB80-4293-2941-5DB4A50CBD82}"/>
               </a:ext>
             </a:extLst>
           </p:cNvPr>
@@ -4396,7 +4401,7 @@
           <p:cNvPr id="28" name="Imagem 27">
             <a:extLst>
               <a:ext uri="{FF2B5EF4-FFF2-40B4-BE49-F238E27FC236}">
-                <a16:creationId xmlns:a16="http://schemas.microsoft.com/office/drawing/2014/main" id="{A1D03C8A-23BD-4EA7-9998-B302B1422F5F}"/>
+                <a16:creationId xmlns="" xmlns:a16="http://schemas.microsoft.com/office/drawing/2014/main" id="{A1D03C8A-23BD-4EA7-9998-B302B1422F5F}"/>
               </a:ext>
             </a:extLst>
           </p:cNvPr>
@@ -4432,7 +4437,7 @@
           <p:cNvPr id="30" name="Imagem 29">
             <a:extLst>
               <a:ext uri="{FF2B5EF4-FFF2-40B4-BE49-F238E27FC236}">
-                <a16:creationId xmlns:a16="http://schemas.microsoft.com/office/drawing/2014/main" id="{CE4BB8B5-50AE-43E4-F518-80313EE8DA1E}"/>
+                <a16:creationId xmlns="" xmlns:a16="http://schemas.microsoft.com/office/drawing/2014/main" id="{CE4BB8B5-50AE-43E4-F518-80313EE8DA1E}"/>
               </a:ext>
             </a:extLst>
           </p:cNvPr>
@@ -4463,6 +4468,1370 @@
           </a:prstGeom>
         </p:spPr>
       </p:pic>
+      <p:sp>
+        <p:nvSpPr>
+          <p:cNvPr id="12" name="Retângulo: Cantos Arredondados 6">
+            <a:extLst>
+              <a:ext uri="{FF2B5EF4-FFF2-40B4-BE49-F238E27FC236}">
+                <a16:creationId xmlns="" xmlns:a16="http://schemas.microsoft.com/office/drawing/2014/main" id="{9DA5E66D-D66E-57F8-877F-DCA698031C15}"/>
+              </a:ext>
+            </a:extLst>
+          </p:cNvPr>
+          <p:cNvSpPr/>
+          <p:nvPr/>
+        </p:nvSpPr>
+        <p:spPr>
+          <a:xfrm>
+            <a:off x="3124440" y="1618048"/>
+            <a:ext cx="511781" cy="201600"/>
+          </a:xfrm>
+          <a:prstGeom prst="roundRect">
+            <a:avLst>
+              <a:gd name="adj" fmla="val 22436"/>
+            </a:avLst>
+          </a:prstGeom>
+          <a:solidFill>
+            <a:srgbClr val="171C24"/>
+          </a:solidFill>
+          <a:ln>
+            <a:noFill/>
+          </a:ln>
+          <a:effectLst>
+            <a:glow rad="139700">
+              <a:schemeClr val="accent1">
+                <a:satMod val="175000"/>
+                <a:alpha val="40000"/>
+              </a:schemeClr>
+            </a:glow>
+          </a:effectLst>
+        </p:spPr>
+        <p:style>
+          <a:lnRef idx="2">
+            <a:schemeClr val="accent1">
+              <a:shade val="50000"/>
+            </a:schemeClr>
+          </a:lnRef>
+          <a:fillRef idx="1">
+            <a:schemeClr val="accent1"/>
+          </a:fillRef>
+          <a:effectRef idx="0">
+            <a:schemeClr val="accent1"/>
+          </a:effectRef>
+          <a:fontRef idx="minor">
+            <a:schemeClr val="lt1"/>
+          </a:fontRef>
+        </p:style>
+        <p:txBody>
+          <a:bodyPr rtlCol="0" anchor="ctr"/>
+          <a:lstStyle/>
+          <a:p>
+            <a:pPr algn="ctr"/>
+            <a:endParaRPr lang="pt-BR" dirty="0"/>
+          </a:p>
+        </p:txBody>
+      </p:sp>
+      <p:sp>
+        <p:nvSpPr>
+          <p:cNvPr id="19" name="Retângulo: Cantos Arredondados 6">
+            <a:extLst>
+              <a:ext uri="{FF2B5EF4-FFF2-40B4-BE49-F238E27FC236}">
+                <a16:creationId xmlns="" xmlns:a16="http://schemas.microsoft.com/office/drawing/2014/main" id="{9DA5E66D-D66E-57F8-877F-DCA698031C15}"/>
+              </a:ext>
+            </a:extLst>
+          </p:cNvPr>
+          <p:cNvSpPr/>
+          <p:nvPr/>
+        </p:nvSpPr>
+        <p:spPr>
+          <a:xfrm>
+            <a:off x="4005800" y="1618048"/>
+            <a:ext cx="1155726" cy="201600"/>
+          </a:xfrm>
+          <a:prstGeom prst="roundRect">
+            <a:avLst>
+              <a:gd name="adj" fmla="val 22436"/>
+            </a:avLst>
+          </a:prstGeom>
+          <a:solidFill>
+            <a:srgbClr val="171C24"/>
+          </a:solidFill>
+          <a:ln>
+            <a:noFill/>
+          </a:ln>
+          <a:effectLst>
+            <a:glow rad="139700">
+              <a:schemeClr val="accent1">
+                <a:satMod val="175000"/>
+                <a:alpha val="40000"/>
+              </a:schemeClr>
+            </a:glow>
+          </a:effectLst>
+        </p:spPr>
+        <p:style>
+          <a:lnRef idx="2">
+            <a:schemeClr val="accent1">
+              <a:shade val="50000"/>
+            </a:schemeClr>
+          </a:lnRef>
+          <a:fillRef idx="1">
+            <a:schemeClr val="accent1"/>
+          </a:fillRef>
+          <a:effectRef idx="0">
+            <a:schemeClr val="accent1"/>
+          </a:effectRef>
+          <a:fontRef idx="minor">
+            <a:schemeClr val="lt1"/>
+          </a:fontRef>
+        </p:style>
+        <p:txBody>
+          <a:bodyPr rtlCol="0" anchor="ctr"/>
+          <a:lstStyle/>
+          <a:p>
+            <a:pPr algn="ctr"/>
+            <a:endParaRPr lang="pt-BR"/>
+          </a:p>
+        </p:txBody>
+      </p:sp>
+      <p:sp>
+        <p:nvSpPr>
+          <p:cNvPr id="20" name="Retângulo: Cantos Arredondados 6">
+            <a:extLst>
+              <a:ext uri="{FF2B5EF4-FFF2-40B4-BE49-F238E27FC236}">
+                <a16:creationId xmlns="" xmlns:a16="http://schemas.microsoft.com/office/drawing/2014/main" id="{9DA5E66D-D66E-57F8-877F-DCA698031C15}"/>
+              </a:ext>
+            </a:extLst>
+          </p:cNvPr>
+          <p:cNvSpPr/>
+          <p:nvPr/>
+        </p:nvSpPr>
+        <p:spPr>
+          <a:xfrm>
+            <a:off x="5531104" y="1618048"/>
+            <a:ext cx="3571332" cy="201600"/>
+          </a:xfrm>
+          <a:prstGeom prst="roundRect">
+            <a:avLst>
+              <a:gd name="adj" fmla="val 22436"/>
+            </a:avLst>
+          </a:prstGeom>
+          <a:solidFill>
+            <a:srgbClr val="171C24"/>
+          </a:solidFill>
+          <a:ln>
+            <a:noFill/>
+          </a:ln>
+          <a:effectLst>
+            <a:glow rad="139700">
+              <a:schemeClr val="accent1">
+                <a:satMod val="175000"/>
+                <a:alpha val="40000"/>
+              </a:schemeClr>
+            </a:glow>
+          </a:effectLst>
+        </p:spPr>
+        <p:style>
+          <a:lnRef idx="2">
+            <a:schemeClr val="accent1">
+              <a:shade val="50000"/>
+            </a:schemeClr>
+          </a:lnRef>
+          <a:fillRef idx="1">
+            <a:schemeClr val="accent1"/>
+          </a:fillRef>
+          <a:effectRef idx="0">
+            <a:schemeClr val="accent1"/>
+          </a:effectRef>
+          <a:fontRef idx="minor">
+            <a:schemeClr val="lt1"/>
+          </a:fontRef>
+        </p:style>
+        <p:txBody>
+          <a:bodyPr rtlCol="0" anchor="ctr"/>
+          <a:lstStyle/>
+          <a:p>
+            <a:pPr algn="ctr"/>
+            <a:endParaRPr lang="pt-BR"/>
+          </a:p>
+        </p:txBody>
+      </p:sp>
+      <p:sp>
+        <p:nvSpPr>
+          <p:cNvPr id="21" name="Retângulo: Cantos Arredondados 6">
+            <a:extLst>
+              <a:ext uri="{FF2B5EF4-FFF2-40B4-BE49-F238E27FC236}">
+                <a16:creationId xmlns="" xmlns:a16="http://schemas.microsoft.com/office/drawing/2014/main" id="{9DA5E66D-D66E-57F8-877F-DCA698031C15}"/>
+              </a:ext>
+            </a:extLst>
+          </p:cNvPr>
+          <p:cNvSpPr/>
+          <p:nvPr/>
+        </p:nvSpPr>
+        <p:spPr>
+          <a:xfrm>
+            <a:off x="9501372" y="1618048"/>
+            <a:ext cx="2201825" cy="201600"/>
+          </a:xfrm>
+          <a:prstGeom prst="roundRect">
+            <a:avLst>
+              <a:gd name="adj" fmla="val 22436"/>
+            </a:avLst>
+          </a:prstGeom>
+          <a:solidFill>
+            <a:srgbClr val="171C24"/>
+          </a:solidFill>
+          <a:ln>
+            <a:noFill/>
+          </a:ln>
+          <a:effectLst>
+            <a:glow rad="139700">
+              <a:schemeClr val="accent1">
+                <a:satMod val="175000"/>
+                <a:alpha val="40000"/>
+              </a:schemeClr>
+            </a:glow>
+          </a:effectLst>
+        </p:spPr>
+        <p:style>
+          <a:lnRef idx="2">
+            <a:schemeClr val="accent1">
+              <a:shade val="50000"/>
+            </a:schemeClr>
+          </a:lnRef>
+          <a:fillRef idx="1">
+            <a:schemeClr val="accent1"/>
+          </a:fillRef>
+          <a:effectRef idx="0">
+            <a:schemeClr val="accent1"/>
+          </a:effectRef>
+          <a:fontRef idx="minor">
+            <a:schemeClr val="lt1"/>
+          </a:fontRef>
+        </p:style>
+        <p:txBody>
+          <a:bodyPr rtlCol="0" anchor="ctr"/>
+          <a:lstStyle/>
+          <a:p>
+            <a:pPr algn="ctr"/>
+            <a:endParaRPr lang="pt-BR"/>
+          </a:p>
+        </p:txBody>
+      </p:sp>
+      <p:sp>
+        <p:nvSpPr>
+          <p:cNvPr id="22" name="Retângulo: Cantos Arredondados 6">
+            <a:extLst>
+              <a:ext uri="{FF2B5EF4-FFF2-40B4-BE49-F238E27FC236}">
+                <a16:creationId xmlns="" xmlns:a16="http://schemas.microsoft.com/office/drawing/2014/main" id="{9DA5E66D-D66E-57F8-877F-DCA698031C15}"/>
+              </a:ext>
+            </a:extLst>
+          </p:cNvPr>
+          <p:cNvSpPr/>
+          <p:nvPr/>
+        </p:nvSpPr>
+        <p:spPr>
+          <a:xfrm>
+            <a:off x="3124440" y="2393904"/>
+            <a:ext cx="2037086" cy="201600"/>
+          </a:xfrm>
+          <a:prstGeom prst="roundRect">
+            <a:avLst>
+              <a:gd name="adj" fmla="val 22436"/>
+            </a:avLst>
+          </a:prstGeom>
+          <a:solidFill>
+            <a:srgbClr val="171C24"/>
+          </a:solidFill>
+          <a:ln>
+            <a:noFill/>
+          </a:ln>
+          <a:effectLst>
+            <a:glow rad="139700">
+              <a:schemeClr val="accent1">
+                <a:satMod val="175000"/>
+                <a:alpha val="40000"/>
+              </a:schemeClr>
+            </a:glow>
+          </a:effectLst>
+        </p:spPr>
+        <p:style>
+          <a:lnRef idx="2">
+            <a:schemeClr val="accent1">
+              <a:shade val="50000"/>
+            </a:schemeClr>
+          </a:lnRef>
+          <a:fillRef idx="1">
+            <a:schemeClr val="accent1"/>
+          </a:fillRef>
+          <a:effectRef idx="0">
+            <a:schemeClr val="accent1"/>
+          </a:effectRef>
+          <a:fontRef idx="minor">
+            <a:schemeClr val="lt1"/>
+          </a:fontRef>
+        </p:style>
+        <p:txBody>
+          <a:bodyPr rtlCol="0" anchor="ctr"/>
+          <a:lstStyle/>
+          <a:p>
+            <a:pPr algn="ctr"/>
+            <a:endParaRPr lang="pt-BR"/>
+          </a:p>
+        </p:txBody>
+      </p:sp>
+      <p:sp>
+        <p:nvSpPr>
+          <p:cNvPr id="23" name="Retângulo: Cantos Arredondados 6">
+            <a:extLst>
+              <a:ext uri="{FF2B5EF4-FFF2-40B4-BE49-F238E27FC236}">
+                <a16:creationId xmlns="" xmlns:a16="http://schemas.microsoft.com/office/drawing/2014/main" id="{9DA5E66D-D66E-57F8-877F-DCA698031C15}"/>
+              </a:ext>
+            </a:extLst>
+          </p:cNvPr>
+          <p:cNvSpPr/>
+          <p:nvPr/>
+        </p:nvSpPr>
+        <p:spPr>
+          <a:xfrm>
+            <a:off x="5531104" y="2393904"/>
+            <a:ext cx="769943" cy="201600"/>
+          </a:xfrm>
+          <a:prstGeom prst="roundRect">
+            <a:avLst>
+              <a:gd name="adj" fmla="val 22436"/>
+            </a:avLst>
+          </a:prstGeom>
+          <a:solidFill>
+            <a:srgbClr val="171C24"/>
+          </a:solidFill>
+          <a:ln>
+            <a:noFill/>
+          </a:ln>
+          <a:effectLst>
+            <a:glow rad="139700">
+              <a:schemeClr val="accent1">
+                <a:satMod val="175000"/>
+                <a:alpha val="40000"/>
+              </a:schemeClr>
+            </a:glow>
+          </a:effectLst>
+        </p:spPr>
+        <p:style>
+          <a:lnRef idx="2">
+            <a:schemeClr val="accent1">
+              <a:shade val="50000"/>
+            </a:schemeClr>
+          </a:lnRef>
+          <a:fillRef idx="1">
+            <a:schemeClr val="accent1"/>
+          </a:fillRef>
+          <a:effectRef idx="0">
+            <a:schemeClr val="accent1"/>
+          </a:effectRef>
+          <a:fontRef idx="minor">
+            <a:schemeClr val="lt1"/>
+          </a:fontRef>
+        </p:style>
+        <p:txBody>
+          <a:bodyPr rtlCol="0" anchor="ctr"/>
+          <a:lstStyle/>
+          <a:p>
+            <a:pPr algn="ctr"/>
+            <a:endParaRPr lang="pt-BR"/>
+          </a:p>
+        </p:txBody>
+      </p:sp>
+      <p:sp>
+        <p:nvSpPr>
+          <p:cNvPr id="25" name="Retângulo: Cantos Arredondados 6">
+            <a:extLst>
+              <a:ext uri="{FF2B5EF4-FFF2-40B4-BE49-F238E27FC236}">
+                <a16:creationId xmlns="" xmlns:a16="http://schemas.microsoft.com/office/drawing/2014/main" id="{9DA5E66D-D66E-57F8-877F-DCA698031C15}"/>
+              </a:ext>
+            </a:extLst>
+          </p:cNvPr>
+          <p:cNvSpPr/>
+          <p:nvPr/>
+        </p:nvSpPr>
+        <p:spPr>
+          <a:xfrm>
+            <a:off x="6637011" y="2393904"/>
+            <a:ext cx="511781" cy="201600"/>
+          </a:xfrm>
+          <a:prstGeom prst="roundRect">
+            <a:avLst>
+              <a:gd name="adj" fmla="val 22436"/>
+            </a:avLst>
+          </a:prstGeom>
+          <a:solidFill>
+            <a:srgbClr val="171C24"/>
+          </a:solidFill>
+          <a:ln>
+            <a:noFill/>
+          </a:ln>
+          <a:effectLst>
+            <a:glow rad="139700">
+              <a:schemeClr val="accent1">
+                <a:satMod val="175000"/>
+                <a:alpha val="40000"/>
+              </a:schemeClr>
+            </a:glow>
+          </a:effectLst>
+        </p:spPr>
+        <p:style>
+          <a:lnRef idx="2">
+            <a:schemeClr val="accent1">
+              <a:shade val="50000"/>
+            </a:schemeClr>
+          </a:lnRef>
+          <a:fillRef idx="1">
+            <a:schemeClr val="accent1"/>
+          </a:fillRef>
+          <a:effectRef idx="0">
+            <a:schemeClr val="accent1"/>
+          </a:effectRef>
+          <a:fontRef idx="minor">
+            <a:schemeClr val="lt1"/>
+          </a:fontRef>
+        </p:style>
+        <p:txBody>
+          <a:bodyPr rtlCol="0" anchor="ctr"/>
+          <a:lstStyle/>
+          <a:p>
+            <a:pPr algn="ctr"/>
+            <a:endParaRPr lang="pt-BR" dirty="0"/>
+          </a:p>
+        </p:txBody>
+      </p:sp>
+      <p:sp>
+        <p:nvSpPr>
+          <p:cNvPr id="26" name="Retângulo: Cantos Arredondados 6">
+            <a:extLst>
+              <a:ext uri="{FF2B5EF4-FFF2-40B4-BE49-F238E27FC236}">
+                <a16:creationId xmlns="" xmlns:a16="http://schemas.microsoft.com/office/drawing/2014/main" id="{9DA5E66D-D66E-57F8-877F-DCA698031C15}"/>
+              </a:ext>
+            </a:extLst>
+          </p:cNvPr>
+          <p:cNvSpPr/>
+          <p:nvPr/>
+        </p:nvSpPr>
+        <p:spPr>
+          <a:xfrm>
+            <a:off x="7573297" y="2393904"/>
+            <a:ext cx="511781" cy="201600"/>
+          </a:xfrm>
+          <a:prstGeom prst="roundRect">
+            <a:avLst>
+              <a:gd name="adj" fmla="val 22436"/>
+            </a:avLst>
+          </a:prstGeom>
+          <a:solidFill>
+            <a:srgbClr val="171C24"/>
+          </a:solidFill>
+          <a:ln>
+            <a:noFill/>
+          </a:ln>
+          <a:effectLst>
+            <a:glow rad="139700">
+              <a:schemeClr val="accent1">
+                <a:satMod val="175000"/>
+                <a:alpha val="40000"/>
+              </a:schemeClr>
+            </a:glow>
+          </a:effectLst>
+        </p:spPr>
+        <p:style>
+          <a:lnRef idx="2">
+            <a:schemeClr val="accent1">
+              <a:shade val="50000"/>
+            </a:schemeClr>
+          </a:lnRef>
+          <a:fillRef idx="1">
+            <a:schemeClr val="accent1"/>
+          </a:fillRef>
+          <a:effectRef idx="0">
+            <a:schemeClr val="accent1"/>
+          </a:effectRef>
+          <a:fontRef idx="minor">
+            <a:schemeClr val="lt1"/>
+          </a:fontRef>
+        </p:style>
+        <p:txBody>
+          <a:bodyPr rtlCol="0" anchor="ctr"/>
+          <a:lstStyle/>
+          <a:p>
+            <a:pPr algn="ctr"/>
+            <a:endParaRPr lang="pt-BR" dirty="0"/>
+          </a:p>
+        </p:txBody>
+      </p:sp>
+      <p:sp>
+        <p:nvSpPr>
+          <p:cNvPr id="29" name="Retângulo: Cantos Arredondados 6">
+            <a:extLst>
+              <a:ext uri="{FF2B5EF4-FFF2-40B4-BE49-F238E27FC236}">
+                <a16:creationId xmlns="" xmlns:a16="http://schemas.microsoft.com/office/drawing/2014/main" id="{9DA5E66D-D66E-57F8-877F-DCA698031C15}"/>
+              </a:ext>
+            </a:extLst>
+          </p:cNvPr>
+          <p:cNvSpPr/>
+          <p:nvPr/>
+        </p:nvSpPr>
+        <p:spPr>
+          <a:xfrm>
+            <a:off x="3124440" y="3111928"/>
+            <a:ext cx="2037086" cy="201600"/>
+          </a:xfrm>
+          <a:prstGeom prst="roundRect">
+            <a:avLst>
+              <a:gd name="adj" fmla="val 22436"/>
+            </a:avLst>
+          </a:prstGeom>
+          <a:solidFill>
+            <a:srgbClr val="171C24"/>
+          </a:solidFill>
+          <a:ln>
+            <a:noFill/>
+          </a:ln>
+          <a:effectLst>
+            <a:glow rad="139700">
+              <a:schemeClr val="accent1">
+                <a:satMod val="175000"/>
+                <a:alpha val="40000"/>
+              </a:schemeClr>
+            </a:glow>
+          </a:effectLst>
+        </p:spPr>
+        <p:style>
+          <a:lnRef idx="2">
+            <a:schemeClr val="accent1">
+              <a:shade val="50000"/>
+            </a:schemeClr>
+          </a:lnRef>
+          <a:fillRef idx="1">
+            <a:schemeClr val="accent1"/>
+          </a:fillRef>
+          <a:effectRef idx="0">
+            <a:schemeClr val="accent1"/>
+          </a:effectRef>
+          <a:fontRef idx="minor">
+            <a:schemeClr val="lt1"/>
+          </a:fontRef>
+        </p:style>
+        <p:txBody>
+          <a:bodyPr rtlCol="0" anchor="ctr"/>
+          <a:lstStyle/>
+          <a:p>
+            <a:pPr algn="ctr"/>
+            <a:endParaRPr lang="pt-BR"/>
+          </a:p>
+        </p:txBody>
+      </p:sp>
+      <p:sp>
+        <p:nvSpPr>
+          <p:cNvPr id="32" name="Retângulo: Cantos Arredondados 6">
+            <a:extLst>
+              <a:ext uri="{FF2B5EF4-FFF2-40B4-BE49-F238E27FC236}">
+                <a16:creationId xmlns="" xmlns:a16="http://schemas.microsoft.com/office/drawing/2014/main" id="{9DA5E66D-D66E-57F8-877F-DCA698031C15}"/>
+              </a:ext>
+            </a:extLst>
+          </p:cNvPr>
+          <p:cNvSpPr/>
+          <p:nvPr/>
+        </p:nvSpPr>
+        <p:spPr>
+          <a:xfrm>
+            <a:off x="6758279" y="3898494"/>
+            <a:ext cx="3176607" cy="201600"/>
+          </a:xfrm>
+          <a:prstGeom prst="roundRect">
+            <a:avLst>
+              <a:gd name="adj" fmla="val 22436"/>
+            </a:avLst>
+          </a:prstGeom>
+          <a:solidFill>
+            <a:srgbClr val="171C24"/>
+          </a:solidFill>
+          <a:ln>
+            <a:noFill/>
+          </a:ln>
+          <a:effectLst>
+            <a:glow rad="139700">
+              <a:schemeClr val="accent1">
+                <a:satMod val="175000"/>
+                <a:alpha val="40000"/>
+              </a:schemeClr>
+            </a:glow>
+          </a:effectLst>
+        </p:spPr>
+        <p:style>
+          <a:lnRef idx="2">
+            <a:schemeClr val="accent1">
+              <a:shade val="50000"/>
+            </a:schemeClr>
+          </a:lnRef>
+          <a:fillRef idx="1">
+            <a:schemeClr val="accent1"/>
+          </a:fillRef>
+          <a:effectRef idx="0">
+            <a:schemeClr val="accent1"/>
+          </a:effectRef>
+          <a:fontRef idx="minor">
+            <a:schemeClr val="lt1"/>
+          </a:fontRef>
+        </p:style>
+        <p:txBody>
+          <a:bodyPr rtlCol="0" anchor="ctr"/>
+          <a:lstStyle/>
+          <a:p>
+            <a:pPr algn="ctr"/>
+            <a:endParaRPr lang="pt-BR"/>
+          </a:p>
+        </p:txBody>
+      </p:sp>
+      <p:sp>
+        <p:nvSpPr>
+          <p:cNvPr id="34" name="Retângulo: Cantos Arredondados 6">
+            <a:extLst>
+              <a:ext uri="{FF2B5EF4-FFF2-40B4-BE49-F238E27FC236}">
+                <a16:creationId xmlns="" xmlns:a16="http://schemas.microsoft.com/office/drawing/2014/main" id="{9DA5E66D-D66E-57F8-877F-DCA698031C15}"/>
+              </a:ext>
+            </a:extLst>
+          </p:cNvPr>
+          <p:cNvSpPr/>
+          <p:nvPr/>
+        </p:nvSpPr>
+        <p:spPr>
+          <a:xfrm>
+            <a:off x="5531104" y="3111928"/>
+            <a:ext cx="3240000" cy="201600"/>
+          </a:xfrm>
+          <a:prstGeom prst="roundRect">
+            <a:avLst>
+              <a:gd name="adj" fmla="val 22436"/>
+            </a:avLst>
+          </a:prstGeom>
+          <a:solidFill>
+            <a:srgbClr val="171C24"/>
+          </a:solidFill>
+          <a:ln>
+            <a:noFill/>
+          </a:ln>
+          <a:effectLst>
+            <a:glow rad="139700">
+              <a:schemeClr val="accent1">
+                <a:satMod val="175000"/>
+                <a:alpha val="40000"/>
+              </a:schemeClr>
+            </a:glow>
+          </a:effectLst>
+        </p:spPr>
+        <p:style>
+          <a:lnRef idx="2">
+            <a:schemeClr val="accent1">
+              <a:shade val="50000"/>
+            </a:schemeClr>
+          </a:lnRef>
+          <a:fillRef idx="1">
+            <a:schemeClr val="accent1"/>
+          </a:fillRef>
+          <a:effectRef idx="0">
+            <a:schemeClr val="accent1"/>
+          </a:effectRef>
+          <a:fontRef idx="minor">
+            <a:schemeClr val="lt1"/>
+          </a:fontRef>
+        </p:style>
+        <p:txBody>
+          <a:bodyPr rtlCol="0" anchor="ctr"/>
+          <a:lstStyle/>
+          <a:p>
+            <a:pPr algn="ctr"/>
+            <a:endParaRPr lang="pt-BR"/>
+          </a:p>
+        </p:txBody>
+      </p:sp>
+      <p:sp>
+        <p:nvSpPr>
+          <p:cNvPr id="37" name="Retângulo: Cantos Arredondados 6">
+            <a:extLst>
+              <a:ext uri="{FF2B5EF4-FFF2-40B4-BE49-F238E27FC236}">
+                <a16:creationId xmlns="" xmlns:a16="http://schemas.microsoft.com/office/drawing/2014/main" id="{9DA5E66D-D66E-57F8-877F-DCA698031C15}"/>
+              </a:ext>
+            </a:extLst>
+          </p:cNvPr>
+          <p:cNvSpPr/>
+          <p:nvPr/>
+        </p:nvSpPr>
+        <p:spPr>
+          <a:xfrm>
+            <a:off x="3124440" y="4662948"/>
+            <a:ext cx="2037086" cy="201600"/>
+          </a:xfrm>
+          <a:prstGeom prst="roundRect">
+            <a:avLst>
+              <a:gd name="adj" fmla="val 22436"/>
+            </a:avLst>
+          </a:prstGeom>
+          <a:solidFill>
+            <a:srgbClr val="171C24"/>
+          </a:solidFill>
+          <a:ln>
+            <a:noFill/>
+          </a:ln>
+          <a:effectLst>
+            <a:glow rad="139700">
+              <a:schemeClr val="accent1">
+                <a:satMod val="175000"/>
+                <a:alpha val="40000"/>
+              </a:schemeClr>
+            </a:glow>
+          </a:effectLst>
+        </p:spPr>
+        <p:style>
+          <a:lnRef idx="2">
+            <a:schemeClr val="accent1">
+              <a:shade val="50000"/>
+            </a:schemeClr>
+          </a:lnRef>
+          <a:fillRef idx="1">
+            <a:schemeClr val="accent1"/>
+          </a:fillRef>
+          <a:effectRef idx="0">
+            <a:schemeClr val="accent1"/>
+          </a:effectRef>
+          <a:fontRef idx="minor">
+            <a:schemeClr val="lt1"/>
+          </a:fontRef>
+        </p:style>
+        <p:txBody>
+          <a:bodyPr rtlCol="0" anchor="ctr"/>
+          <a:lstStyle/>
+          <a:p>
+            <a:pPr algn="ctr"/>
+            <a:endParaRPr lang="pt-BR"/>
+          </a:p>
+        </p:txBody>
+      </p:sp>
+      <p:sp>
+        <p:nvSpPr>
+          <p:cNvPr id="38" name="Retângulo: Cantos Arredondados 6">
+            <a:extLst>
+              <a:ext uri="{FF2B5EF4-FFF2-40B4-BE49-F238E27FC236}">
+                <a16:creationId xmlns="" xmlns:a16="http://schemas.microsoft.com/office/drawing/2014/main" id="{9DA5E66D-D66E-57F8-877F-DCA698031C15}"/>
+              </a:ext>
+            </a:extLst>
+          </p:cNvPr>
+          <p:cNvSpPr/>
+          <p:nvPr/>
+        </p:nvSpPr>
+        <p:spPr>
+          <a:xfrm>
+            <a:off x="5546027" y="4662948"/>
+            <a:ext cx="3571332" cy="201600"/>
+          </a:xfrm>
+          <a:prstGeom prst="roundRect">
+            <a:avLst>
+              <a:gd name="adj" fmla="val 22436"/>
+            </a:avLst>
+          </a:prstGeom>
+          <a:solidFill>
+            <a:srgbClr val="171C24"/>
+          </a:solidFill>
+          <a:ln>
+            <a:noFill/>
+          </a:ln>
+          <a:effectLst>
+            <a:glow rad="139700">
+              <a:schemeClr val="accent1">
+                <a:satMod val="175000"/>
+                <a:alpha val="40000"/>
+              </a:schemeClr>
+            </a:glow>
+          </a:effectLst>
+        </p:spPr>
+        <p:style>
+          <a:lnRef idx="2">
+            <a:schemeClr val="accent1">
+              <a:shade val="50000"/>
+            </a:schemeClr>
+          </a:lnRef>
+          <a:fillRef idx="1">
+            <a:schemeClr val="accent1"/>
+          </a:fillRef>
+          <a:effectRef idx="0">
+            <a:schemeClr val="accent1"/>
+          </a:effectRef>
+          <a:fontRef idx="minor">
+            <a:schemeClr val="lt1"/>
+          </a:fontRef>
+        </p:style>
+        <p:txBody>
+          <a:bodyPr rtlCol="0" anchor="ctr"/>
+          <a:lstStyle/>
+          <a:p>
+            <a:pPr algn="ctr"/>
+            <a:endParaRPr lang="pt-BR"/>
+          </a:p>
+        </p:txBody>
+      </p:sp>
+      <p:sp>
+        <p:nvSpPr>
+          <p:cNvPr id="43" name="Retângulo: Cantos Arredondados 6">
+            <a:extLst>
+              <a:ext uri="{FF2B5EF4-FFF2-40B4-BE49-F238E27FC236}">
+                <a16:creationId xmlns="" xmlns:a16="http://schemas.microsoft.com/office/drawing/2014/main" id="{9DA5E66D-D66E-57F8-877F-DCA698031C15}"/>
+              </a:ext>
+            </a:extLst>
+          </p:cNvPr>
+          <p:cNvSpPr/>
+          <p:nvPr/>
+        </p:nvSpPr>
+        <p:spPr>
+          <a:xfrm>
+            <a:off x="9392794" y="4662948"/>
+            <a:ext cx="2310403" cy="1775459"/>
+          </a:xfrm>
+          <a:prstGeom prst="roundRect">
+            <a:avLst>
+              <a:gd name="adj" fmla="val 5885"/>
+            </a:avLst>
+          </a:prstGeom>
+          <a:solidFill>
+            <a:srgbClr val="171C24"/>
+          </a:solidFill>
+          <a:ln>
+            <a:noFill/>
+          </a:ln>
+          <a:effectLst>
+            <a:glow rad="139700">
+              <a:schemeClr val="accent1">
+                <a:satMod val="175000"/>
+                <a:alpha val="40000"/>
+              </a:schemeClr>
+            </a:glow>
+          </a:effectLst>
+        </p:spPr>
+        <p:style>
+          <a:lnRef idx="2">
+            <a:schemeClr val="accent1">
+              <a:shade val="50000"/>
+            </a:schemeClr>
+          </a:lnRef>
+          <a:fillRef idx="1">
+            <a:schemeClr val="accent1"/>
+          </a:fillRef>
+          <a:effectRef idx="0">
+            <a:schemeClr val="accent1"/>
+          </a:effectRef>
+          <a:fontRef idx="minor">
+            <a:schemeClr val="lt1"/>
+          </a:fontRef>
+        </p:style>
+        <p:txBody>
+          <a:bodyPr rtlCol="0" anchor="ctr"/>
+          <a:lstStyle/>
+          <a:p>
+            <a:pPr algn="ctr"/>
+            <a:endParaRPr lang="pt-BR"/>
+          </a:p>
+        </p:txBody>
+      </p:sp>
+      <p:sp>
+        <p:nvSpPr>
+          <p:cNvPr id="47" name="Retângulo: Cantos Arredondados 6">
+            <a:extLst>
+              <a:ext uri="{FF2B5EF4-FFF2-40B4-BE49-F238E27FC236}">
+                <a16:creationId xmlns="" xmlns:a16="http://schemas.microsoft.com/office/drawing/2014/main" id="{9DA5E66D-D66E-57F8-877F-DCA698031C15}"/>
+              </a:ext>
+            </a:extLst>
+          </p:cNvPr>
+          <p:cNvSpPr/>
+          <p:nvPr/>
+        </p:nvSpPr>
+        <p:spPr>
+          <a:xfrm>
+            <a:off x="9579563" y="4866192"/>
+            <a:ext cx="1936865" cy="201600"/>
+          </a:xfrm>
+          <a:prstGeom prst="roundRect">
+            <a:avLst>
+              <a:gd name="adj" fmla="val 22436"/>
+            </a:avLst>
+          </a:prstGeom>
+          <a:solidFill>
+            <a:srgbClr val="171C24"/>
+          </a:solidFill>
+          <a:ln>
+            <a:noFill/>
+          </a:ln>
+          <a:effectLst>
+            <a:glow rad="139700">
+              <a:schemeClr val="accent1">
+                <a:satMod val="175000"/>
+                <a:alpha val="40000"/>
+              </a:schemeClr>
+            </a:glow>
+          </a:effectLst>
+        </p:spPr>
+        <p:style>
+          <a:lnRef idx="2">
+            <a:schemeClr val="accent1">
+              <a:shade val="50000"/>
+            </a:schemeClr>
+          </a:lnRef>
+          <a:fillRef idx="1">
+            <a:schemeClr val="accent1"/>
+          </a:fillRef>
+          <a:effectRef idx="0">
+            <a:schemeClr val="accent1"/>
+          </a:effectRef>
+          <a:fontRef idx="minor">
+            <a:schemeClr val="lt1"/>
+          </a:fontRef>
+        </p:style>
+        <p:txBody>
+          <a:bodyPr rtlCol="0" anchor="ctr"/>
+          <a:lstStyle/>
+          <a:p>
+            <a:pPr algn="ctr"/>
+            <a:endParaRPr lang="pt-BR"/>
+          </a:p>
+        </p:txBody>
+      </p:sp>
+      <p:sp>
+        <p:nvSpPr>
+          <p:cNvPr id="49" name="Retângulo: Cantos Arredondados 6">
+            <a:extLst>
+              <a:ext uri="{FF2B5EF4-FFF2-40B4-BE49-F238E27FC236}">
+                <a16:creationId xmlns="" xmlns:a16="http://schemas.microsoft.com/office/drawing/2014/main" id="{9DA5E66D-D66E-57F8-877F-DCA698031C15}"/>
+              </a:ext>
+            </a:extLst>
+          </p:cNvPr>
+          <p:cNvSpPr/>
+          <p:nvPr/>
+        </p:nvSpPr>
+        <p:spPr>
+          <a:xfrm>
+            <a:off x="10528887" y="5462750"/>
+            <a:ext cx="987541" cy="201600"/>
+          </a:xfrm>
+          <a:prstGeom prst="roundRect">
+            <a:avLst>
+              <a:gd name="adj" fmla="val 22436"/>
+            </a:avLst>
+          </a:prstGeom>
+          <a:solidFill>
+            <a:srgbClr val="171C24"/>
+          </a:solidFill>
+          <a:ln>
+            <a:noFill/>
+          </a:ln>
+          <a:effectLst>
+            <a:glow rad="139700">
+              <a:schemeClr val="accent1">
+                <a:satMod val="175000"/>
+                <a:alpha val="40000"/>
+              </a:schemeClr>
+            </a:glow>
+          </a:effectLst>
+        </p:spPr>
+        <p:style>
+          <a:lnRef idx="2">
+            <a:schemeClr val="accent1">
+              <a:shade val="50000"/>
+            </a:schemeClr>
+          </a:lnRef>
+          <a:fillRef idx="1">
+            <a:schemeClr val="accent1"/>
+          </a:fillRef>
+          <a:effectRef idx="0">
+            <a:schemeClr val="accent1"/>
+          </a:effectRef>
+          <a:fontRef idx="minor">
+            <a:schemeClr val="lt1"/>
+          </a:fontRef>
+        </p:style>
+        <p:txBody>
+          <a:bodyPr rtlCol="0" anchor="ctr"/>
+          <a:lstStyle/>
+          <a:p>
+            <a:pPr algn="ctr"/>
+            <a:endParaRPr lang="pt-BR"/>
+          </a:p>
+        </p:txBody>
+      </p:sp>
+      <p:sp>
+        <p:nvSpPr>
+          <p:cNvPr id="50" name="Retângulo: Cantos Arredondados 6">
+            <a:extLst>
+              <a:ext uri="{FF2B5EF4-FFF2-40B4-BE49-F238E27FC236}">
+                <a16:creationId xmlns="" xmlns:a16="http://schemas.microsoft.com/office/drawing/2014/main" id="{9DA5E66D-D66E-57F8-877F-DCA698031C15}"/>
+              </a:ext>
+            </a:extLst>
+          </p:cNvPr>
+          <p:cNvSpPr/>
+          <p:nvPr/>
+        </p:nvSpPr>
+        <p:spPr>
+          <a:xfrm>
+            <a:off x="9183197" y="3111928"/>
+            <a:ext cx="2520000" cy="201600"/>
+          </a:xfrm>
+          <a:prstGeom prst="roundRect">
+            <a:avLst>
+              <a:gd name="adj" fmla="val 22436"/>
+            </a:avLst>
+          </a:prstGeom>
+          <a:solidFill>
+            <a:srgbClr val="171C24"/>
+          </a:solidFill>
+          <a:ln>
+            <a:noFill/>
+          </a:ln>
+          <a:effectLst>
+            <a:glow rad="139700">
+              <a:schemeClr val="accent1">
+                <a:satMod val="175000"/>
+                <a:alpha val="40000"/>
+              </a:schemeClr>
+            </a:glow>
+          </a:effectLst>
+        </p:spPr>
+        <p:style>
+          <a:lnRef idx="2">
+            <a:schemeClr val="accent1">
+              <a:shade val="50000"/>
+            </a:schemeClr>
+          </a:lnRef>
+          <a:fillRef idx="1">
+            <a:schemeClr val="accent1"/>
+          </a:fillRef>
+          <a:effectRef idx="0">
+            <a:schemeClr val="accent1"/>
+          </a:effectRef>
+          <a:fontRef idx="minor">
+            <a:schemeClr val="lt1"/>
+          </a:fontRef>
+        </p:style>
+        <p:txBody>
+          <a:bodyPr rtlCol="0" anchor="ctr"/>
+          <a:lstStyle/>
+          <a:p>
+            <a:pPr algn="ctr"/>
+            <a:endParaRPr lang="pt-BR"/>
+          </a:p>
+        </p:txBody>
+      </p:sp>
+      <p:sp>
+        <p:nvSpPr>
+          <p:cNvPr id="40" name="Retângulo: Cantos Arredondados 6">
+            <a:extLst>
+              <a:ext uri="{FF2B5EF4-FFF2-40B4-BE49-F238E27FC236}">
+                <a16:creationId xmlns="" xmlns:a16="http://schemas.microsoft.com/office/drawing/2014/main" id="{9DA5E66D-D66E-57F8-877F-DCA698031C15}"/>
+              </a:ext>
+            </a:extLst>
+          </p:cNvPr>
+          <p:cNvSpPr/>
+          <p:nvPr/>
+        </p:nvSpPr>
+        <p:spPr>
+          <a:xfrm>
+            <a:off x="4542970" y="5504967"/>
+            <a:ext cx="2340000" cy="201600"/>
+          </a:xfrm>
+          <a:prstGeom prst="roundRect">
+            <a:avLst>
+              <a:gd name="adj" fmla="val 22436"/>
+            </a:avLst>
+          </a:prstGeom>
+          <a:solidFill>
+            <a:srgbClr val="171C24"/>
+          </a:solidFill>
+          <a:ln>
+            <a:noFill/>
+          </a:ln>
+          <a:effectLst>
+            <a:glow rad="139700">
+              <a:schemeClr val="accent1">
+                <a:satMod val="175000"/>
+                <a:alpha val="40000"/>
+              </a:schemeClr>
+            </a:glow>
+          </a:effectLst>
+        </p:spPr>
+        <p:style>
+          <a:lnRef idx="2">
+            <a:schemeClr val="accent1">
+              <a:shade val="50000"/>
+            </a:schemeClr>
+          </a:lnRef>
+          <a:fillRef idx="1">
+            <a:schemeClr val="accent1"/>
+          </a:fillRef>
+          <a:effectRef idx="0">
+            <a:schemeClr val="accent1"/>
+          </a:effectRef>
+          <a:fontRef idx="minor">
+            <a:schemeClr val="lt1"/>
+          </a:fontRef>
+        </p:style>
+        <p:txBody>
+          <a:bodyPr rtlCol="0" anchor="ctr"/>
+          <a:lstStyle/>
+          <a:p>
+            <a:pPr algn="ctr"/>
+            <a:endParaRPr lang="pt-BR"/>
+          </a:p>
+        </p:txBody>
+      </p:sp>
+      <p:sp>
+        <p:nvSpPr>
+          <p:cNvPr id="42" name="Retângulo: Cantos Arredondados 6">
+            <a:extLst>
+              <a:ext uri="{FF2B5EF4-FFF2-40B4-BE49-F238E27FC236}">
+                <a16:creationId xmlns="" xmlns:a16="http://schemas.microsoft.com/office/drawing/2014/main" id="{9DA5E66D-D66E-57F8-877F-DCA698031C15}"/>
+              </a:ext>
+            </a:extLst>
+          </p:cNvPr>
+          <p:cNvSpPr/>
+          <p:nvPr/>
+        </p:nvSpPr>
+        <p:spPr>
+          <a:xfrm>
+            <a:off x="3124440" y="6236807"/>
+            <a:ext cx="3758530" cy="201600"/>
+          </a:xfrm>
+          <a:prstGeom prst="roundRect">
+            <a:avLst>
+              <a:gd name="adj" fmla="val 22436"/>
+            </a:avLst>
+          </a:prstGeom>
+          <a:solidFill>
+            <a:srgbClr val="171C24"/>
+          </a:solidFill>
+          <a:ln>
+            <a:noFill/>
+          </a:ln>
+          <a:effectLst>
+            <a:glow rad="139700">
+              <a:schemeClr val="accent1">
+                <a:satMod val="175000"/>
+                <a:alpha val="40000"/>
+              </a:schemeClr>
+            </a:glow>
+          </a:effectLst>
+        </p:spPr>
+        <p:style>
+          <a:lnRef idx="2">
+            <a:schemeClr val="accent1">
+              <a:shade val="50000"/>
+            </a:schemeClr>
+          </a:lnRef>
+          <a:fillRef idx="1">
+            <a:schemeClr val="accent1"/>
+          </a:fillRef>
+          <a:effectRef idx="0">
+            <a:schemeClr val="accent1"/>
+          </a:effectRef>
+          <a:fontRef idx="minor">
+            <a:schemeClr val="lt1"/>
+          </a:fontRef>
+        </p:style>
+        <p:txBody>
+          <a:bodyPr rtlCol="0" anchor="ctr"/>
+          <a:lstStyle/>
+          <a:p>
+            <a:pPr algn="ctr"/>
+            <a:endParaRPr lang="pt-BR"/>
+          </a:p>
+        </p:txBody>
+      </p:sp>
+      <p:sp>
+        <p:nvSpPr>
+          <p:cNvPr id="52" name="Retângulo: Cantos Arredondados 6">
+            <a:extLst>
+              <a:ext uri="{FF2B5EF4-FFF2-40B4-BE49-F238E27FC236}">
+                <a16:creationId xmlns="" xmlns:a16="http://schemas.microsoft.com/office/drawing/2014/main" id="{9DA5E66D-D66E-57F8-877F-DCA698031C15}"/>
+              </a:ext>
+            </a:extLst>
+          </p:cNvPr>
+          <p:cNvSpPr/>
+          <p:nvPr/>
+        </p:nvSpPr>
+        <p:spPr>
+          <a:xfrm>
+            <a:off x="3124440" y="5504967"/>
+            <a:ext cx="987541" cy="201600"/>
+          </a:xfrm>
+          <a:prstGeom prst="roundRect">
+            <a:avLst>
+              <a:gd name="adj" fmla="val 22436"/>
+            </a:avLst>
+          </a:prstGeom>
+          <a:solidFill>
+            <a:srgbClr val="171C24"/>
+          </a:solidFill>
+          <a:ln>
+            <a:noFill/>
+          </a:ln>
+          <a:effectLst>
+            <a:glow rad="139700">
+              <a:schemeClr val="accent1">
+                <a:satMod val="175000"/>
+                <a:alpha val="40000"/>
+              </a:schemeClr>
+            </a:glow>
+          </a:effectLst>
+        </p:spPr>
+        <p:style>
+          <a:lnRef idx="2">
+            <a:schemeClr val="accent1">
+              <a:shade val="50000"/>
+            </a:schemeClr>
+          </a:lnRef>
+          <a:fillRef idx="1">
+            <a:schemeClr val="accent1"/>
+          </a:fillRef>
+          <a:effectRef idx="0">
+            <a:schemeClr val="accent1"/>
+          </a:effectRef>
+          <a:fontRef idx="minor">
+            <a:schemeClr val="lt1"/>
+          </a:fontRef>
+        </p:style>
+        <p:txBody>
+          <a:bodyPr rtlCol="0" anchor="ctr"/>
+          <a:lstStyle/>
+          <a:p>
+            <a:pPr algn="ctr"/>
+            <a:endParaRPr lang="pt-BR"/>
+          </a:p>
+        </p:txBody>
+      </p:sp>
+      <p:sp>
+        <p:nvSpPr>
+          <p:cNvPr id="33" name="Retângulo: Cantos Arredondados 6">
+            <a:extLst>
+              <a:ext uri="{FF2B5EF4-FFF2-40B4-BE49-F238E27FC236}">
+                <a16:creationId xmlns="" xmlns:a16="http://schemas.microsoft.com/office/drawing/2014/main" id="{9DA5E66D-D66E-57F8-877F-DCA698031C15}"/>
+              </a:ext>
+            </a:extLst>
+          </p:cNvPr>
+          <p:cNvSpPr/>
+          <p:nvPr/>
+        </p:nvSpPr>
+        <p:spPr>
+          <a:xfrm>
+            <a:off x="3124440" y="3898494"/>
+            <a:ext cx="511781" cy="201600"/>
+          </a:xfrm>
+          <a:prstGeom prst="roundRect">
+            <a:avLst>
+              <a:gd name="adj" fmla="val 22436"/>
+            </a:avLst>
+          </a:prstGeom>
+          <a:solidFill>
+            <a:srgbClr val="171C24"/>
+          </a:solidFill>
+          <a:ln>
+            <a:noFill/>
+          </a:ln>
+          <a:effectLst>
+            <a:glow rad="139700">
+              <a:schemeClr val="accent1">
+                <a:satMod val="175000"/>
+                <a:alpha val="40000"/>
+              </a:schemeClr>
+            </a:glow>
+          </a:effectLst>
+        </p:spPr>
+        <p:style>
+          <a:lnRef idx="2">
+            <a:schemeClr val="accent1">
+              <a:shade val="50000"/>
+            </a:schemeClr>
+          </a:lnRef>
+          <a:fillRef idx="1">
+            <a:schemeClr val="accent1"/>
+          </a:fillRef>
+          <a:effectRef idx="0">
+            <a:schemeClr val="accent1"/>
+          </a:effectRef>
+          <a:fontRef idx="minor">
+            <a:schemeClr val="lt1"/>
+          </a:fontRef>
+        </p:style>
+        <p:txBody>
+          <a:bodyPr rtlCol="0" anchor="ctr"/>
+          <a:lstStyle/>
+          <a:p>
+            <a:pPr algn="ctr"/>
+            <a:endParaRPr lang="pt-BR" dirty="0"/>
+          </a:p>
+        </p:txBody>
+      </p:sp>
+      <p:sp>
+        <p:nvSpPr>
+          <p:cNvPr id="35" name="Retângulo: Cantos Arredondados 6">
+            <a:extLst>
+              <a:ext uri="{FF2B5EF4-FFF2-40B4-BE49-F238E27FC236}">
+                <a16:creationId xmlns="" xmlns:a16="http://schemas.microsoft.com/office/drawing/2014/main" id="{9DA5E66D-D66E-57F8-877F-DCA698031C15}"/>
+              </a:ext>
+            </a:extLst>
+          </p:cNvPr>
+          <p:cNvSpPr/>
+          <p:nvPr/>
+        </p:nvSpPr>
+        <p:spPr>
+          <a:xfrm>
+            <a:off x="4111981" y="3898494"/>
+            <a:ext cx="2037086" cy="201600"/>
+          </a:xfrm>
+          <a:prstGeom prst="roundRect">
+            <a:avLst>
+              <a:gd name="adj" fmla="val 22436"/>
+            </a:avLst>
+          </a:prstGeom>
+          <a:solidFill>
+            <a:srgbClr val="171C24"/>
+          </a:solidFill>
+          <a:ln>
+            <a:noFill/>
+          </a:ln>
+          <a:effectLst>
+            <a:glow rad="139700">
+              <a:schemeClr val="accent1">
+                <a:satMod val="175000"/>
+                <a:alpha val="40000"/>
+              </a:schemeClr>
+            </a:glow>
+          </a:effectLst>
+        </p:spPr>
+        <p:style>
+          <a:lnRef idx="2">
+            <a:schemeClr val="accent1">
+              <a:shade val="50000"/>
+            </a:schemeClr>
+          </a:lnRef>
+          <a:fillRef idx="1">
+            <a:schemeClr val="accent1"/>
+          </a:fillRef>
+          <a:effectRef idx="0">
+            <a:schemeClr val="accent1"/>
+          </a:effectRef>
+          <a:fontRef idx="minor">
+            <a:schemeClr val="lt1"/>
+          </a:fontRef>
+        </p:style>
+        <p:txBody>
+          <a:bodyPr rtlCol="0" anchor="ctr"/>
+          <a:lstStyle/>
+          <a:p>
+            <a:pPr algn="ctr"/>
+            <a:endParaRPr lang="pt-BR"/>
+          </a:p>
+        </p:txBody>
+      </p:sp>
     </p:spTree>
     <p:extLst>
       <p:ext uri="{BB962C8B-B14F-4D97-AF65-F5344CB8AC3E}">
@@ -4498,7 +5867,7 @@
           <p:cNvPr id="4" name="Retângulo 3">
             <a:extLst>
               <a:ext uri="{FF2B5EF4-FFF2-40B4-BE49-F238E27FC236}">
-                <a16:creationId xmlns:a16="http://schemas.microsoft.com/office/drawing/2014/main" id="{3BA201EF-028A-4A58-FFA1-51254C6AB7C0}"/>
+                <a16:creationId xmlns="" xmlns:a16="http://schemas.microsoft.com/office/drawing/2014/main" id="{3BA201EF-028A-4A58-FFA1-51254C6AB7C0}"/>
               </a:ext>
             </a:extLst>
           </p:cNvPr>
@@ -4552,7 +5921,7 @@
           <p:cNvPr id="6" name="Retângulo: Cantos Arredondados 5">
             <a:extLst>
               <a:ext uri="{FF2B5EF4-FFF2-40B4-BE49-F238E27FC236}">
-                <a16:creationId xmlns:a16="http://schemas.microsoft.com/office/drawing/2014/main" id="{C9D2942A-A28F-0258-8D12-A28CC24C2DE6}"/>
+                <a16:creationId xmlns="" xmlns:a16="http://schemas.microsoft.com/office/drawing/2014/main" id="{C9D2942A-A28F-0258-8D12-A28CC24C2DE6}"/>
               </a:ext>
             </a:extLst>
           </p:cNvPr>
@@ -4619,7 +5988,7 @@
           <p:cNvPr id="7" name="Retângulo: Cantos Arredondados 6">
             <a:extLst>
               <a:ext uri="{FF2B5EF4-FFF2-40B4-BE49-F238E27FC236}">
-                <a16:creationId xmlns:a16="http://schemas.microsoft.com/office/drawing/2014/main" id="{9DA5E66D-D66E-57F8-877F-DCA698031C15}"/>
+                <a16:creationId xmlns="" xmlns:a16="http://schemas.microsoft.com/office/drawing/2014/main" id="{9DA5E66D-D66E-57F8-877F-DCA698031C15}"/>
               </a:ext>
             </a:extLst>
           </p:cNvPr>
@@ -4681,7 +6050,7 @@
           <p:cNvPr id="12" name="Retângulo: Cantos Arredondados 11">
             <a:extLst>
               <a:ext uri="{FF2B5EF4-FFF2-40B4-BE49-F238E27FC236}">
-                <a16:creationId xmlns:a16="http://schemas.microsoft.com/office/drawing/2014/main" id="{FB6BAAF6-B2F0-E5EB-7C79-93CD8129F389}"/>
+                <a16:creationId xmlns="" xmlns:a16="http://schemas.microsoft.com/office/drawing/2014/main" id="{FB6BAAF6-B2F0-E5EB-7C79-93CD8129F389}"/>
               </a:ext>
             </a:extLst>
           </p:cNvPr>
@@ -4743,7 +6112,7 @@
           <p:cNvPr id="2" name="Retângulo: Cantos Arredondados 1">
             <a:extLst>
               <a:ext uri="{FF2B5EF4-FFF2-40B4-BE49-F238E27FC236}">
-                <a16:creationId xmlns:a16="http://schemas.microsoft.com/office/drawing/2014/main" id="{29D4EF6D-B470-4F1A-37E7-EF51EE298F6E}"/>
+                <a16:creationId xmlns="" xmlns:a16="http://schemas.microsoft.com/office/drawing/2014/main" id="{29D4EF6D-B470-4F1A-37E7-EF51EE298F6E}"/>
               </a:ext>
             </a:extLst>
           </p:cNvPr>

</xml_diff>